<commit_message>
Add spec parts 8 and 9 in Spanish
</commit_message>
<xml_diff>
--- a/Specification/English/Editable source images/Images Spec Part 8 - External elements.pptx
+++ b/Specification/English/Editable source images/Images Spec Part 8 - External elements.pptx
@@ -10,8 +10,9 @@
     <p:sldId id="286" r:id="rId4"/>
     <p:sldId id="289" r:id="rId5"/>
     <p:sldId id="290" r:id="rId6"/>
-    <p:sldId id="291" r:id="rId7"/>
-    <p:sldId id="292" r:id="rId8"/>
+    <p:sldId id="293" r:id="rId7"/>
+    <p:sldId id="291" r:id="rId8"/>
+    <p:sldId id="292" r:id="rId9"/>
   </p:sldIdLst>
   <p:sldSz cx="12192000" cy="6858000"/>
   <p:notesSz cx="6858000" cy="9144000"/>
@@ -112,7 +113,7 @@
   </p:defaultTextStyle>
   <p:extLst>
     <p:ext uri="{EFAFB233-063F-42B5-8137-9DF3F51BA10A}">
-      <p15:sldGuideLst xmlns="" xmlns:p15="http://schemas.microsoft.com/office/powerpoint/2012/main">
+      <p15:sldGuideLst xmlns:p15="http://schemas.microsoft.com/office/powerpoint/2012/main" xmlns="">
         <p15:guide id="1" orient="horz" pos="2160">
           <p15:clr>
             <a:srgbClr val="A4A3A4"/>
@@ -151,7 +152,7 @@
           <p:cNvPr id="2" name="Título 1">
             <a:extLst>
               <a:ext uri="{FF2B5EF4-FFF2-40B4-BE49-F238E27FC236}">
-                <a16:creationId xmlns="" xmlns:a16="http://schemas.microsoft.com/office/drawing/2014/main" id="{E3B9DF4B-0C72-4846-9560-CA4C0EF12637}"/>
+                <a16:creationId xmlns:a16="http://schemas.microsoft.com/office/drawing/2014/main" xmlns="" id="{E3B9DF4B-0C72-4846-9560-CA4C0EF12637}"/>
               </a:ext>
             </a:extLst>
           </p:cNvPr>
@@ -188,7 +189,7 @@
           <p:cNvPr id="3" name="Subtítulo 2">
             <a:extLst>
               <a:ext uri="{FF2B5EF4-FFF2-40B4-BE49-F238E27FC236}">
-                <a16:creationId xmlns="" xmlns:a16="http://schemas.microsoft.com/office/drawing/2014/main" id="{685B1628-0B9C-4511-8020-749CB381CA8A}"/>
+                <a16:creationId xmlns:a16="http://schemas.microsoft.com/office/drawing/2014/main" xmlns="" id="{685B1628-0B9C-4511-8020-749CB381CA8A}"/>
               </a:ext>
             </a:extLst>
           </p:cNvPr>
@@ -258,7 +259,7 @@
           <p:cNvPr id="4" name="Marcador de fecha 3">
             <a:extLst>
               <a:ext uri="{FF2B5EF4-FFF2-40B4-BE49-F238E27FC236}">
-                <a16:creationId xmlns="" xmlns:a16="http://schemas.microsoft.com/office/drawing/2014/main" id="{94B80B3E-D487-4AED-BB83-C0CCE4C60C28}"/>
+                <a16:creationId xmlns:a16="http://schemas.microsoft.com/office/drawing/2014/main" xmlns="" id="{94B80B3E-D487-4AED-BB83-C0CCE4C60C28}"/>
               </a:ext>
             </a:extLst>
           </p:cNvPr>
@@ -277,7 +278,7 @@
             <a:fld id="{EFBC5A1B-75D9-4BC9-8C41-860857045191}" type="datetimeFigureOut">
               <a:rPr lang="es-ES" smtClean="0"/>
               <a:pPr/>
-              <a:t>31/12/2022</a:t>
+              <a:t>17/01/2024</a:t>
             </a:fld>
             <a:endParaRPr lang="es-ES"/>
           </a:p>
@@ -288,7 +289,7 @@
           <p:cNvPr id="5" name="Marcador de pie de página 4">
             <a:extLst>
               <a:ext uri="{FF2B5EF4-FFF2-40B4-BE49-F238E27FC236}">
-                <a16:creationId xmlns="" xmlns:a16="http://schemas.microsoft.com/office/drawing/2014/main" id="{4C360251-304A-4F05-98C3-0F4C6ACE97D7}"/>
+                <a16:creationId xmlns:a16="http://schemas.microsoft.com/office/drawing/2014/main" xmlns="" id="{4C360251-304A-4F05-98C3-0F4C6ACE97D7}"/>
               </a:ext>
             </a:extLst>
           </p:cNvPr>
@@ -313,7 +314,7 @@
           <p:cNvPr id="6" name="Marcador de número de diapositiva 5">
             <a:extLst>
               <a:ext uri="{FF2B5EF4-FFF2-40B4-BE49-F238E27FC236}">
-                <a16:creationId xmlns="" xmlns:a16="http://schemas.microsoft.com/office/drawing/2014/main" id="{6799EFD0-FF52-4DE6-868B-77F17D2F4FF0}"/>
+                <a16:creationId xmlns:a16="http://schemas.microsoft.com/office/drawing/2014/main" xmlns="" id="{6799EFD0-FF52-4DE6-868B-77F17D2F4FF0}"/>
               </a:ext>
             </a:extLst>
           </p:cNvPr>
@@ -341,7 +342,7 @@
     </p:spTree>
     <p:extLst>
       <p:ext uri="{BB962C8B-B14F-4D97-AF65-F5344CB8AC3E}">
-        <p14:creationId xmlns="" xmlns:p14="http://schemas.microsoft.com/office/powerpoint/2010/main" val="3630569971"/>
+        <p14:creationId xmlns:p14="http://schemas.microsoft.com/office/powerpoint/2010/main" xmlns="" val="3630569971"/>
       </p:ext>
     </p:extLst>
   </p:cSld>
@@ -373,7 +374,7 @@
           <p:cNvPr id="2" name="Título 1">
             <a:extLst>
               <a:ext uri="{FF2B5EF4-FFF2-40B4-BE49-F238E27FC236}">
-                <a16:creationId xmlns="" xmlns:a16="http://schemas.microsoft.com/office/drawing/2014/main" id="{0DC87140-B7D9-4FA4-A34F-FB77A3666A4F}"/>
+                <a16:creationId xmlns:a16="http://schemas.microsoft.com/office/drawing/2014/main" xmlns="" id="{0DC87140-B7D9-4FA4-A34F-FB77A3666A4F}"/>
               </a:ext>
             </a:extLst>
           </p:cNvPr>
@@ -401,7 +402,7 @@
           <p:cNvPr id="3" name="Marcador de texto vertical 2">
             <a:extLst>
               <a:ext uri="{FF2B5EF4-FFF2-40B4-BE49-F238E27FC236}">
-                <a16:creationId xmlns="" xmlns:a16="http://schemas.microsoft.com/office/drawing/2014/main" id="{850563DB-D0F8-4DBB-A77B-19BBDF9BDBCD}"/>
+                <a16:creationId xmlns:a16="http://schemas.microsoft.com/office/drawing/2014/main" xmlns="" id="{850563DB-D0F8-4DBB-A77B-19BBDF9BDBCD}"/>
               </a:ext>
             </a:extLst>
           </p:cNvPr>
@@ -458,7 +459,7 @@
           <p:cNvPr id="4" name="Marcador de fecha 3">
             <a:extLst>
               <a:ext uri="{FF2B5EF4-FFF2-40B4-BE49-F238E27FC236}">
-                <a16:creationId xmlns="" xmlns:a16="http://schemas.microsoft.com/office/drawing/2014/main" id="{F3F66AC4-DE53-4169-9771-B049F319EEA9}"/>
+                <a16:creationId xmlns:a16="http://schemas.microsoft.com/office/drawing/2014/main" xmlns="" id="{F3F66AC4-DE53-4169-9771-B049F319EEA9}"/>
               </a:ext>
             </a:extLst>
           </p:cNvPr>
@@ -477,7 +478,7 @@
             <a:fld id="{EFBC5A1B-75D9-4BC9-8C41-860857045191}" type="datetimeFigureOut">
               <a:rPr lang="es-ES" smtClean="0"/>
               <a:pPr/>
-              <a:t>31/12/2022</a:t>
+              <a:t>17/01/2024</a:t>
             </a:fld>
             <a:endParaRPr lang="es-ES"/>
           </a:p>
@@ -488,7 +489,7 @@
           <p:cNvPr id="5" name="Marcador de pie de página 4">
             <a:extLst>
               <a:ext uri="{FF2B5EF4-FFF2-40B4-BE49-F238E27FC236}">
-                <a16:creationId xmlns="" xmlns:a16="http://schemas.microsoft.com/office/drawing/2014/main" id="{7F1B4E51-E6DE-4608-865D-CC9B9B289FC7}"/>
+                <a16:creationId xmlns:a16="http://schemas.microsoft.com/office/drawing/2014/main" xmlns="" id="{7F1B4E51-E6DE-4608-865D-CC9B9B289FC7}"/>
               </a:ext>
             </a:extLst>
           </p:cNvPr>
@@ -513,7 +514,7 @@
           <p:cNvPr id="6" name="Marcador de número de diapositiva 5">
             <a:extLst>
               <a:ext uri="{FF2B5EF4-FFF2-40B4-BE49-F238E27FC236}">
-                <a16:creationId xmlns="" xmlns:a16="http://schemas.microsoft.com/office/drawing/2014/main" id="{AC49A7EA-BD2D-4D11-9E44-7FD8F2848414}"/>
+                <a16:creationId xmlns:a16="http://schemas.microsoft.com/office/drawing/2014/main" xmlns="" id="{AC49A7EA-BD2D-4D11-9E44-7FD8F2848414}"/>
               </a:ext>
             </a:extLst>
           </p:cNvPr>
@@ -541,7 +542,7 @@
     </p:spTree>
     <p:extLst>
       <p:ext uri="{BB962C8B-B14F-4D97-AF65-F5344CB8AC3E}">
-        <p14:creationId xmlns="" xmlns:p14="http://schemas.microsoft.com/office/powerpoint/2010/main" val="3667736171"/>
+        <p14:creationId xmlns:p14="http://schemas.microsoft.com/office/powerpoint/2010/main" xmlns="" val="3667736171"/>
       </p:ext>
     </p:extLst>
   </p:cSld>
@@ -573,7 +574,7 @@
           <p:cNvPr id="2" name="Título vertical 1">
             <a:extLst>
               <a:ext uri="{FF2B5EF4-FFF2-40B4-BE49-F238E27FC236}">
-                <a16:creationId xmlns="" xmlns:a16="http://schemas.microsoft.com/office/drawing/2014/main" id="{5B32CEA0-9850-4637-812E-6A3BA3FDCDE1}"/>
+                <a16:creationId xmlns:a16="http://schemas.microsoft.com/office/drawing/2014/main" xmlns="" id="{5B32CEA0-9850-4637-812E-6A3BA3FDCDE1}"/>
               </a:ext>
             </a:extLst>
           </p:cNvPr>
@@ -606,7 +607,7 @@
           <p:cNvPr id="3" name="Marcador de texto vertical 2">
             <a:extLst>
               <a:ext uri="{FF2B5EF4-FFF2-40B4-BE49-F238E27FC236}">
-                <a16:creationId xmlns="" xmlns:a16="http://schemas.microsoft.com/office/drawing/2014/main" id="{939BC441-ACB3-491E-BDDF-AAB44A6A9480}"/>
+                <a16:creationId xmlns:a16="http://schemas.microsoft.com/office/drawing/2014/main" xmlns="" id="{939BC441-ACB3-491E-BDDF-AAB44A6A9480}"/>
               </a:ext>
             </a:extLst>
           </p:cNvPr>
@@ -668,7 +669,7 @@
           <p:cNvPr id="4" name="Marcador de fecha 3">
             <a:extLst>
               <a:ext uri="{FF2B5EF4-FFF2-40B4-BE49-F238E27FC236}">
-                <a16:creationId xmlns="" xmlns:a16="http://schemas.microsoft.com/office/drawing/2014/main" id="{4E5F3364-5D05-4590-944A-B62A5881200D}"/>
+                <a16:creationId xmlns:a16="http://schemas.microsoft.com/office/drawing/2014/main" xmlns="" id="{4E5F3364-5D05-4590-944A-B62A5881200D}"/>
               </a:ext>
             </a:extLst>
           </p:cNvPr>
@@ -687,7 +688,7 @@
             <a:fld id="{EFBC5A1B-75D9-4BC9-8C41-860857045191}" type="datetimeFigureOut">
               <a:rPr lang="es-ES" smtClean="0"/>
               <a:pPr/>
-              <a:t>31/12/2022</a:t>
+              <a:t>17/01/2024</a:t>
             </a:fld>
             <a:endParaRPr lang="es-ES"/>
           </a:p>
@@ -698,7 +699,7 @@
           <p:cNvPr id="5" name="Marcador de pie de página 4">
             <a:extLst>
               <a:ext uri="{FF2B5EF4-FFF2-40B4-BE49-F238E27FC236}">
-                <a16:creationId xmlns="" xmlns:a16="http://schemas.microsoft.com/office/drawing/2014/main" id="{F6634A9D-820F-4C3B-AD07-AAB5383B1C30}"/>
+                <a16:creationId xmlns:a16="http://schemas.microsoft.com/office/drawing/2014/main" xmlns="" id="{F6634A9D-820F-4C3B-AD07-AAB5383B1C30}"/>
               </a:ext>
             </a:extLst>
           </p:cNvPr>
@@ -723,7 +724,7 @@
           <p:cNvPr id="6" name="Marcador de número de diapositiva 5">
             <a:extLst>
               <a:ext uri="{FF2B5EF4-FFF2-40B4-BE49-F238E27FC236}">
-                <a16:creationId xmlns="" xmlns:a16="http://schemas.microsoft.com/office/drawing/2014/main" id="{AF9F029D-3E88-4B7B-BB5B-24C24BC15CA7}"/>
+                <a16:creationId xmlns:a16="http://schemas.microsoft.com/office/drawing/2014/main" xmlns="" id="{AF9F029D-3E88-4B7B-BB5B-24C24BC15CA7}"/>
               </a:ext>
             </a:extLst>
           </p:cNvPr>
@@ -751,7 +752,7 @@
     </p:spTree>
     <p:extLst>
       <p:ext uri="{BB962C8B-B14F-4D97-AF65-F5344CB8AC3E}">
-        <p14:creationId xmlns="" xmlns:p14="http://schemas.microsoft.com/office/powerpoint/2010/main" val="3527137102"/>
+        <p14:creationId xmlns:p14="http://schemas.microsoft.com/office/powerpoint/2010/main" xmlns="" val="3527137102"/>
       </p:ext>
     </p:extLst>
   </p:cSld>
@@ -783,7 +784,7 @@
           <p:cNvPr id="2" name="Título 1">
             <a:extLst>
               <a:ext uri="{FF2B5EF4-FFF2-40B4-BE49-F238E27FC236}">
-                <a16:creationId xmlns="" xmlns:a16="http://schemas.microsoft.com/office/drawing/2014/main" id="{08950D71-BF45-4BBD-819C-49E969998269}"/>
+                <a16:creationId xmlns:a16="http://schemas.microsoft.com/office/drawing/2014/main" xmlns="" id="{08950D71-BF45-4BBD-819C-49E969998269}"/>
               </a:ext>
             </a:extLst>
           </p:cNvPr>
@@ -811,7 +812,7 @@
           <p:cNvPr id="3" name="Marcador de contenido 2">
             <a:extLst>
               <a:ext uri="{FF2B5EF4-FFF2-40B4-BE49-F238E27FC236}">
-                <a16:creationId xmlns="" xmlns:a16="http://schemas.microsoft.com/office/drawing/2014/main" id="{961FBA74-E944-406F-826A-2C37A64FD07F}"/>
+                <a16:creationId xmlns:a16="http://schemas.microsoft.com/office/drawing/2014/main" xmlns="" id="{961FBA74-E944-406F-826A-2C37A64FD07F}"/>
               </a:ext>
             </a:extLst>
           </p:cNvPr>
@@ -868,7 +869,7 @@
           <p:cNvPr id="4" name="Marcador de fecha 3">
             <a:extLst>
               <a:ext uri="{FF2B5EF4-FFF2-40B4-BE49-F238E27FC236}">
-                <a16:creationId xmlns="" xmlns:a16="http://schemas.microsoft.com/office/drawing/2014/main" id="{9BF5C59E-1E2B-45B4-9381-181FD109BDB3}"/>
+                <a16:creationId xmlns:a16="http://schemas.microsoft.com/office/drawing/2014/main" xmlns="" id="{9BF5C59E-1E2B-45B4-9381-181FD109BDB3}"/>
               </a:ext>
             </a:extLst>
           </p:cNvPr>
@@ -887,7 +888,7 @@
             <a:fld id="{EFBC5A1B-75D9-4BC9-8C41-860857045191}" type="datetimeFigureOut">
               <a:rPr lang="es-ES" smtClean="0"/>
               <a:pPr/>
-              <a:t>31/12/2022</a:t>
+              <a:t>17/01/2024</a:t>
             </a:fld>
             <a:endParaRPr lang="es-ES"/>
           </a:p>
@@ -898,7 +899,7 @@
           <p:cNvPr id="5" name="Marcador de pie de página 4">
             <a:extLst>
               <a:ext uri="{FF2B5EF4-FFF2-40B4-BE49-F238E27FC236}">
-                <a16:creationId xmlns="" xmlns:a16="http://schemas.microsoft.com/office/drawing/2014/main" id="{A837392A-47E5-47F6-8C55-2267B7EEB618}"/>
+                <a16:creationId xmlns:a16="http://schemas.microsoft.com/office/drawing/2014/main" xmlns="" id="{A837392A-47E5-47F6-8C55-2267B7EEB618}"/>
               </a:ext>
             </a:extLst>
           </p:cNvPr>
@@ -923,7 +924,7 @@
           <p:cNvPr id="6" name="Marcador de número de diapositiva 5">
             <a:extLst>
               <a:ext uri="{FF2B5EF4-FFF2-40B4-BE49-F238E27FC236}">
-                <a16:creationId xmlns="" xmlns:a16="http://schemas.microsoft.com/office/drawing/2014/main" id="{2DAD3A73-252F-438F-9D6E-BFF97E283E0E}"/>
+                <a16:creationId xmlns:a16="http://schemas.microsoft.com/office/drawing/2014/main" xmlns="" id="{2DAD3A73-252F-438F-9D6E-BFF97E283E0E}"/>
               </a:ext>
             </a:extLst>
           </p:cNvPr>
@@ -951,7 +952,7 @@
     </p:spTree>
     <p:extLst>
       <p:ext uri="{BB962C8B-B14F-4D97-AF65-F5344CB8AC3E}">
-        <p14:creationId xmlns="" xmlns:p14="http://schemas.microsoft.com/office/powerpoint/2010/main" val="3101532947"/>
+        <p14:creationId xmlns:p14="http://schemas.microsoft.com/office/powerpoint/2010/main" xmlns="" val="3101532947"/>
       </p:ext>
     </p:extLst>
   </p:cSld>
@@ -983,7 +984,7 @@
           <p:cNvPr id="2" name="Título 1">
             <a:extLst>
               <a:ext uri="{FF2B5EF4-FFF2-40B4-BE49-F238E27FC236}">
-                <a16:creationId xmlns="" xmlns:a16="http://schemas.microsoft.com/office/drawing/2014/main" id="{D95F49E8-9F51-4C29-B594-41EFB07B151D}"/>
+                <a16:creationId xmlns:a16="http://schemas.microsoft.com/office/drawing/2014/main" xmlns="" id="{D95F49E8-9F51-4C29-B594-41EFB07B151D}"/>
               </a:ext>
             </a:extLst>
           </p:cNvPr>
@@ -1020,7 +1021,7 @@
           <p:cNvPr id="3" name="Marcador de texto 2">
             <a:extLst>
               <a:ext uri="{FF2B5EF4-FFF2-40B4-BE49-F238E27FC236}">
-                <a16:creationId xmlns="" xmlns:a16="http://schemas.microsoft.com/office/drawing/2014/main" id="{14212A7B-BB3F-43D7-BB50-5C778BF31233}"/>
+                <a16:creationId xmlns:a16="http://schemas.microsoft.com/office/drawing/2014/main" xmlns="" id="{14212A7B-BB3F-43D7-BB50-5C778BF31233}"/>
               </a:ext>
             </a:extLst>
           </p:cNvPr>
@@ -1145,7 +1146,7 @@
           <p:cNvPr id="4" name="Marcador de fecha 3">
             <a:extLst>
               <a:ext uri="{FF2B5EF4-FFF2-40B4-BE49-F238E27FC236}">
-                <a16:creationId xmlns="" xmlns:a16="http://schemas.microsoft.com/office/drawing/2014/main" id="{4D1F1240-5664-43E2-A8B7-3D42989C6517}"/>
+                <a16:creationId xmlns:a16="http://schemas.microsoft.com/office/drawing/2014/main" xmlns="" id="{4D1F1240-5664-43E2-A8B7-3D42989C6517}"/>
               </a:ext>
             </a:extLst>
           </p:cNvPr>
@@ -1164,7 +1165,7 @@
             <a:fld id="{EFBC5A1B-75D9-4BC9-8C41-860857045191}" type="datetimeFigureOut">
               <a:rPr lang="es-ES" smtClean="0"/>
               <a:pPr/>
-              <a:t>31/12/2022</a:t>
+              <a:t>17/01/2024</a:t>
             </a:fld>
             <a:endParaRPr lang="es-ES"/>
           </a:p>
@@ -1175,7 +1176,7 @@
           <p:cNvPr id="5" name="Marcador de pie de página 4">
             <a:extLst>
               <a:ext uri="{FF2B5EF4-FFF2-40B4-BE49-F238E27FC236}">
-                <a16:creationId xmlns="" xmlns:a16="http://schemas.microsoft.com/office/drawing/2014/main" id="{92038497-9614-49CA-BFAB-997CB1B236C1}"/>
+                <a16:creationId xmlns:a16="http://schemas.microsoft.com/office/drawing/2014/main" xmlns="" id="{92038497-9614-49CA-BFAB-997CB1B236C1}"/>
               </a:ext>
             </a:extLst>
           </p:cNvPr>
@@ -1200,7 +1201,7 @@
           <p:cNvPr id="6" name="Marcador de número de diapositiva 5">
             <a:extLst>
               <a:ext uri="{FF2B5EF4-FFF2-40B4-BE49-F238E27FC236}">
-                <a16:creationId xmlns="" xmlns:a16="http://schemas.microsoft.com/office/drawing/2014/main" id="{833C8CA2-40EC-4045-B0F5-731AF8AEEFD1}"/>
+                <a16:creationId xmlns:a16="http://schemas.microsoft.com/office/drawing/2014/main" xmlns="" id="{833C8CA2-40EC-4045-B0F5-731AF8AEEFD1}"/>
               </a:ext>
             </a:extLst>
           </p:cNvPr>
@@ -1228,7 +1229,7 @@
     </p:spTree>
     <p:extLst>
       <p:ext uri="{BB962C8B-B14F-4D97-AF65-F5344CB8AC3E}">
-        <p14:creationId xmlns="" xmlns:p14="http://schemas.microsoft.com/office/powerpoint/2010/main" val="3711361680"/>
+        <p14:creationId xmlns:p14="http://schemas.microsoft.com/office/powerpoint/2010/main" xmlns="" val="3711361680"/>
       </p:ext>
     </p:extLst>
   </p:cSld>
@@ -1260,7 +1261,7 @@
           <p:cNvPr id="2" name="Título 1">
             <a:extLst>
               <a:ext uri="{FF2B5EF4-FFF2-40B4-BE49-F238E27FC236}">
-                <a16:creationId xmlns="" xmlns:a16="http://schemas.microsoft.com/office/drawing/2014/main" id="{41A6C47D-FD4D-4D43-801F-330700505E61}"/>
+                <a16:creationId xmlns:a16="http://schemas.microsoft.com/office/drawing/2014/main" xmlns="" id="{41A6C47D-FD4D-4D43-801F-330700505E61}"/>
               </a:ext>
             </a:extLst>
           </p:cNvPr>
@@ -1288,7 +1289,7 @@
           <p:cNvPr id="3" name="Marcador de contenido 2">
             <a:extLst>
               <a:ext uri="{FF2B5EF4-FFF2-40B4-BE49-F238E27FC236}">
-                <a16:creationId xmlns="" xmlns:a16="http://schemas.microsoft.com/office/drawing/2014/main" id="{D281C82E-1633-42E6-B5C4-E8BF7CD2F9B4}"/>
+                <a16:creationId xmlns:a16="http://schemas.microsoft.com/office/drawing/2014/main" xmlns="" id="{D281C82E-1633-42E6-B5C4-E8BF7CD2F9B4}"/>
               </a:ext>
             </a:extLst>
           </p:cNvPr>
@@ -1350,7 +1351,7 @@
           <p:cNvPr id="4" name="Marcador de contenido 3">
             <a:extLst>
               <a:ext uri="{FF2B5EF4-FFF2-40B4-BE49-F238E27FC236}">
-                <a16:creationId xmlns="" xmlns:a16="http://schemas.microsoft.com/office/drawing/2014/main" id="{BCA14AFC-7189-41E3-BA37-BCF1815CF68C}"/>
+                <a16:creationId xmlns:a16="http://schemas.microsoft.com/office/drawing/2014/main" xmlns="" id="{BCA14AFC-7189-41E3-BA37-BCF1815CF68C}"/>
               </a:ext>
             </a:extLst>
           </p:cNvPr>
@@ -1412,7 +1413,7 @@
           <p:cNvPr id="5" name="Marcador de fecha 4">
             <a:extLst>
               <a:ext uri="{FF2B5EF4-FFF2-40B4-BE49-F238E27FC236}">
-                <a16:creationId xmlns="" xmlns:a16="http://schemas.microsoft.com/office/drawing/2014/main" id="{C9ABDD57-5E98-4A92-91B4-6445F2830FC3}"/>
+                <a16:creationId xmlns:a16="http://schemas.microsoft.com/office/drawing/2014/main" xmlns="" id="{C9ABDD57-5E98-4A92-91B4-6445F2830FC3}"/>
               </a:ext>
             </a:extLst>
           </p:cNvPr>
@@ -1431,7 +1432,7 @@
             <a:fld id="{EFBC5A1B-75D9-4BC9-8C41-860857045191}" type="datetimeFigureOut">
               <a:rPr lang="es-ES" smtClean="0"/>
               <a:pPr/>
-              <a:t>31/12/2022</a:t>
+              <a:t>17/01/2024</a:t>
             </a:fld>
             <a:endParaRPr lang="es-ES"/>
           </a:p>
@@ -1442,7 +1443,7 @@
           <p:cNvPr id="6" name="Marcador de pie de página 5">
             <a:extLst>
               <a:ext uri="{FF2B5EF4-FFF2-40B4-BE49-F238E27FC236}">
-                <a16:creationId xmlns="" xmlns:a16="http://schemas.microsoft.com/office/drawing/2014/main" id="{8BE8DE0D-8FE7-404D-82FA-81005C035303}"/>
+                <a16:creationId xmlns:a16="http://schemas.microsoft.com/office/drawing/2014/main" xmlns="" id="{8BE8DE0D-8FE7-404D-82FA-81005C035303}"/>
               </a:ext>
             </a:extLst>
           </p:cNvPr>
@@ -1467,7 +1468,7 @@
           <p:cNvPr id="7" name="Marcador de número de diapositiva 6">
             <a:extLst>
               <a:ext uri="{FF2B5EF4-FFF2-40B4-BE49-F238E27FC236}">
-                <a16:creationId xmlns="" xmlns:a16="http://schemas.microsoft.com/office/drawing/2014/main" id="{D89226D1-4424-4713-8FA0-A7E883DDCC6D}"/>
+                <a16:creationId xmlns:a16="http://schemas.microsoft.com/office/drawing/2014/main" xmlns="" id="{D89226D1-4424-4713-8FA0-A7E883DDCC6D}"/>
               </a:ext>
             </a:extLst>
           </p:cNvPr>
@@ -1495,7 +1496,7 @@
     </p:spTree>
     <p:extLst>
       <p:ext uri="{BB962C8B-B14F-4D97-AF65-F5344CB8AC3E}">
-        <p14:creationId xmlns="" xmlns:p14="http://schemas.microsoft.com/office/powerpoint/2010/main" val="2478964046"/>
+        <p14:creationId xmlns:p14="http://schemas.microsoft.com/office/powerpoint/2010/main" xmlns="" val="2478964046"/>
       </p:ext>
     </p:extLst>
   </p:cSld>
@@ -1527,7 +1528,7 @@
           <p:cNvPr id="2" name="Título 1">
             <a:extLst>
               <a:ext uri="{FF2B5EF4-FFF2-40B4-BE49-F238E27FC236}">
-                <a16:creationId xmlns="" xmlns:a16="http://schemas.microsoft.com/office/drawing/2014/main" id="{202F9D12-A55E-498F-94E5-6AA1DDDCC6AA}"/>
+                <a16:creationId xmlns:a16="http://schemas.microsoft.com/office/drawing/2014/main" xmlns="" id="{202F9D12-A55E-498F-94E5-6AA1DDDCC6AA}"/>
               </a:ext>
             </a:extLst>
           </p:cNvPr>
@@ -1560,7 +1561,7 @@
           <p:cNvPr id="3" name="Marcador de texto 2">
             <a:extLst>
               <a:ext uri="{FF2B5EF4-FFF2-40B4-BE49-F238E27FC236}">
-                <a16:creationId xmlns="" xmlns:a16="http://schemas.microsoft.com/office/drawing/2014/main" id="{F45F8F00-0AAE-4BCC-ACE0-EF39A7855793}"/>
+                <a16:creationId xmlns:a16="http://schemas.microsoft.com/office/drawing/2014/main" xmlns="" id="{F45F8F00-0AAE-4BCC-ACE0-EF39A7855793}"/>
               </a:ext>
             </a:extLst>
           </p:cNvPr>
@@ -1631,7 +1632,7 @@
           <p:cNvPr id="4" name="Marcador de contenido 3">
             <a:extLst>
               <a:ext uri="{FF2B5EF4-FFF2-40B4-BE49-F238E27FC236}">
-                <a16:creationId xmlns="" xmlns:a16="http://schemas.microsoft.com/office/drawing/2014/main" id="{480D2540-C401-4457-A666-27A2FE07A1EB}"/>
+                <a16:creationId xmlns:a16="http://schemas.microsoft.com/office/drawing/2014/main" xmlns="" id="{480D2540-C401-4457-A666-27A2FE07A1EB}"/>
               </a:ext>
             </a:extLst>
           </p:cNvPr>
@@ -1693,7 +1694,7 @@
           <p:cNvPr id="5" name="Marcador de texto 4">
             <a:extLst>
               <a:ext uri="{FF2B5EF4-FFF2-40B4-BE49-F238E27FC236}">
-                <a16:creationId xmlns="" xmlns:a16="http://schemas.microsoft.com/office/drawing/2014/main" id="{162F695D-A642-46C8-A831-1B43A3621DC9}"/>
+                <a16:creationId xmlns:a16="http://schemas.microsoft.com/office/drawing/2014/main" xmlns="" id="{162F695D-A642-46C8-A831-1B43A3621DC9}"/>
               </a:ext>
             </a:extLst>
           </p:cNvPr>
@@ -1764,7 +1765,7 @@
           <p:cNvPr id="6" name="Marcador de contenido 5">
             <a:extLst>
               <a:ext uri="{FF2B5EF4-FFF2-40B4-BE49-F238E27FC236}">
-                <a16:creationId xmlns="" xmlns:a16="http://schemas.microsoft.com/office/drawing/2014/main" id="{28899A86-5725-455F-94EE-5587484C3ADA}"/>
+                <a16:creationId xmlns:a16="http://schemas.microsoft.com/office/drawing/2014/main" xmlns="" id="{28899A86-5725-455F-94EE-5587484C3ADA}"/>
               </a:ext>
             </a:extLst>
           </p:cNvPr>
@@ -1826,7 +1827,7 @@
           <p:cNvPr id="7" name="Marcador de fecha 6">
             <a:extLst>
               <a:ext uri="{FF2B5EF4-FFF2-40B4-BE49-F238E27FC236}">
-                <a16:creationId xmlns="" xmlns:a16="http://schemas.microsoft.com/office/drawing/2014/main" id="{71554A8D-DBE0-4421-9267-7776721E8BE7}"/>
+                <a16:creationId xmlns:a16="http://schemas.microsoft.com/office/drawing/2014/main" xmlns="" id="{71554A8D-DBE0-4421-9267-7776721E8BE7}"/>
               </a:ext>
             </a:extLst>
           </p:cNvPr>
@@ -1845,7 +1846,7 @@
             <a:fld id="{EFBC5A1B-75D9-4BC9-8C41-860857045191}" type="datetimeFigureOut">
               <a:rPr lang="es-ES" smtClean="0"/>
               <a:pPr/>
-              <a:t>31/12/2022</a:t>
+              <a:t>17/01/2024</a:t>
             </a:fld>
             <a:endParaRPr lang="es-ES"/>
           </a:p>
@@ -1856,7 +1857,7 @@
           <p:cNvPr id="8" name="Marcador de pie de página 7">
             <a:extLst>
               <a:ext uri="{FF2B5EF4-FFF2-40B4-BE49-F238E27FC236}">
-                <a16:creationId xmlns="" xmlns:a16="http://schemas.microsoft.com/office/drawing/2014/main" id="{71B657D1-4479-4DAA-A27D-75F0872E33AC}"/>
+                <a16:creationId xmlns:a16="http://schemas.microsoft.com/office/drawing/2014/main" xmlns="" id="{71B657D1-4479-4DAA-A27D-75F0872E33AC}"/>
               </a:ext>
             </a:extLst>
           </p:cNvPr>
@@ -1881,7 +1882,7 @@
           <p:cNvPr id="9" name="Marcador de número de diapositiva 8">
             <a:extLst>
               <a:ext uri="{FF2B5EF4-FFF2-40B4-BE49-F238E27FC236}">
-                <a16:creationId xmlns="" xmlns:a16="http://schemas.microsoft.com/office/drawing/2014/main" id="{72E44760-02D4-4C5D-83CF-6712A8290F9D}"/>
+                <a16:creationId xmlns:a16="http://schemas.microsoft.com/office/drawing/2014/main" xmlns="" id="{72E44760-02D4-4C5D-83CF-6712A8290F9D}"/>
               </a:ext>
             </a:extLst>
           </p:cNvPr>
@@ -1909,7 +1910,7 @@
     </p:spTree>
     <p:extLst>
       <p:ext uri="{BB962C8B-B14F-4D97-AF65-F5344CB8AC3E}">
-        <p14:creationId xmlns="" xmlns:p14="http://schemas.microsoft.com/office/powerpoint/2010/main" val="4187433897"/>
+        <p14:creationId xmlns:p14="http://schemas.microsoft.com/office/powerpoint/2010/main" xmlns="" val="4187433897"/>
       </p:ext>
     </p:extLst>
   </p:cSld>
@@ -1941,7 +1942,7 @@
           <p:cNvPr id="2" name="Título 1">
             <a:extLst>
               <a:ext uri="{FF2B5EF4-FFF2-40B4-BE49-F238E27FC236}">
-                <a16:creationId xmlns="" xmlns:a16="http://schemas.microsoft.com/office/drawing/2014/main" id="{6270498C-939A-497C-AF25-022EDE14FDF4}"/>
+                <a16:creationId xmlns:a16="http://schemas.microsoft.com/office/drawing/2014/main" xmlns="" id="{6270498C-939A-497C-AF25-022EDE14FDF4}"/>
               </a:ext>
             </a:extLst>
           </p:cNvPr>
@@ -1969,7 +1970,7 @@
           <p:cNvPr id="3" name="Marcador de fecha 2">
             <a:extLst>
               <a:ext uri="{FF2B5EF4-FFF2-40B4-BE49-F238E27FC236}">
-                <a16:creationId xmlns="" xmlns:a16="http://schemas.microsoft.com/office/drawing/2014/main" id="{38BD6F06-A827-4D38-A1D9-D7BF5373DAD4}"/>
+                <a16:creationId xmlns:a16="http://schemas.microsoft.com/office/drawing/2014/main" xmlns="" id="{38BD6F06-A827-4D38-A1D9-D7BF5373DAD4}"/>
               </a:ext>
             </a:extLst>
           </p:cNvPr>
@@ -1988,7 +1989,7 @@
             <a:fld id="{EFBC5A1B-75D9-4BC9-8C41-860857045191}" type="datetimeFigureOut">
               <a:rPr lang="es-ES" smtClean="0"/>
               <a:pPr/>
-              <a:t>31/12/2022</a:t>
+              <a:t>17/01/2024</a:t>
             </a:fld>
             <a:endParaRPr lang="es-ES"/>
           </a:p>
@@ -1999,7 +2000,7 @@
           <p:cNvPr id="4" name="Marcador de pie de página 3">
             <a:extLst>
               <a:ext uri="{FF2B5EF4-FFF2-40B4-BE49-F238E27FC236}">
-                <a16:creationId xmlns="" xmlns:a16="http://schemas.microsoft.com/office/drawing/2014/main" id="{3F2DAFBA-2A4E-4070-8FD2-B6A0C9CD462C}"/>
+                <a16:creationId xmlns:a16="http://schemas.microsoft.com/office/drawing/2014/main" xmlns="" id="{3F2DAFBA-2A4E-4070-8FD2-B6A0C9CD462C}"/>
               </a:ext>
             </a:extLst>
           </p:cNvPr>
@@ -2024,7 +2025,7 @@
           <p:cNvPr id="5" name="Marcador de número de diapositiva 4">
             <a:extLst>
               <a:ext uri="{FF2B5EF4-FFF2-40B4-BE49-F238E27FC236}">
-                <a16:creationId xmlns="" xmlns:a16="http://schemas.microsoft.com/office/drawing/2014/main" id="{E3299BBA-08D4-4CE8-8C03-024C7A0AB49C}"/>
+                <a16:creationId xmlns:a16="http://schemas.microsoft.com/office/drawing/2014/main" xmlns="" id="{E3299BBA-08D4-4CE8-8C03-024C7A0AB49C}"/>
               </a:ext>
             </a:extLst>
           </p:cNvPr>
@@ -2052,7 +2053,7 @@
     </p:spTree>
     <p:extLst>
       <p:ext uri="{BB962C8B-B14F-4D97-AF65-F5344CB8AC3E}">
-        <p14:creationId xmlns="" xmlns:p14="http://schemas.microsoft.com/office/powerpoint/2010/main" val="1211332172"/>
+        <p14:creationId xmlns:p14="http://schemas.microsoft.com/office/powerpoint/2010/main" xmlns="" val="1211332172"/>
       </p:ext>
     </p:extLst>
   </p:cSld>
@@ -2084,7 +2085,7 @@
           <p:cNvPr id="2" name="Marcador de fecha 1">
             <a:extLst>
               <a:ext uri="{FF2B5EF4-FFF2-40B4-BE49-F238E27FC236}">
-                <a16:creationId xmlns="" xmlns:a16="http://schemas.microsoft.com/office/drawing/2014/main" id="{B2784211-5E54-4766-8B46-12C57FCBC2B6}"/>
+                <a16:creationId xmlns:a16="http://schemas.microsoft.com/office/drawing/2014/main" xmlns="" id="{B2784211-5E54-4766-8B46-12C57FCBC2B6}"/>
               </a:ext>
             </a:extLst>
           </p:cNvPr>
@@ -2103,7 +2104,7 @@
             <a:fld id="{EFBC5A1B-75D9-4BC9-8C41-860857045191}" type="datetimeFigureOut">
               <a:rPr lang="es-ES" smtClean="0"/>
               <a:pPr/>
-              <a:t>31/12/2022</a:t>
+              <a:t>17/01/2024</a:t>
             </a:fld>
             <a:endParaRPr lang="es-ES"/>
           </a:p>
@@ -2114,7 +2115,7 @@
           <p:cNvPr id="3" name="Marcador de pie de página 2">
             <a:extLst>
               <a:ext uri="{FF2B5EF4-FFF2-40B4-BE49-F238E27FC236}">
-                <a16:creationId xmlns="" xmlns:a16="http://schemas.microsoft.com/office/drawing/2014/main" id="{92520B57-CC9A-4071-8120-E857E89EDEB8}"/>
+                <a16:creationId xmlns:a16="http://schemas.microsoft.com/office/drawing/2014/main" xmlns="" id="{92520B57-CC9A-4071-8120-E857E89EDEB8}"/>
               </a:ext>
             </a:extLst>
           </p:cNvPr>
@@ -2139,7 +2140,7 @@
           <p:cNvPr id="4" name="Marcador de número de diapositiva 3">
             <a:extLst>
               <a:ext uri="{FF2B5EF4-FFF2-40B4-BE49-F238E27FC236}">
-                <a16:creationId xmlns="" xmlns:a16="http://schemas.microsoft.com/office/drawing/2014/main" id="{8787466D-3F3F-4F9A-B628-C2FA36CE4FE2}"/>
+                <a16:creationId xmlns:a16="http://schemas.microsoft.com/office/drawing/2014/main" xmlns="" id="{8787466D-3F3F-4F9A-B628-C2FA36CE4FE2}"/>
               </a:ext>
             </a:extLst>
           </p:cNvPr>
@@ -2167,7 +2168,7 @@
     </p:spTree>
     <p:extLst>
       <p:ext uri="{BB962C8B-B14F-4D97-AF65-F5344CB8AC3E}">
-        <p14:creationId xmlns="" xmlns:p14="http://schemas.microsoft.com/office/powerpoint/2010/main" val="2413498818"/>
+        <p14:creationId xmlns:p14="http://schemas.microsoft.com/office/powerpoint/2010/main" xmlns="" val="2413498818"/>
       </p:ext>
     </p:extLst>
   </p:cSld>
@@ -2199,7 +2200,7 @@
           <p:cNvPr id="2" name="Título 1">
             <a:extLst>
               <a:ext uri="{FF2B5EF4-FFF2-40B4-BE49-F238E27FC236}">
-                <a16:creationId xmlns="" xmlns:a16="http://schemas.microsoft.com/office/drawing/2014/main" id="{44E3FDF0-D5CD-4C55-83E1-A554A3F3F591}"/>
+                <a16:creationId xmlns:a16="http://schemas.microsoft.com/office/drawing/2014/main" xmlns="" id="{44E3FDF0-D5CD-4C55-83E1-A554A3F3F591}"/>
               </a:ext>
             </a:extLst>
           </p:cNvPr>
@@ -2236,7 +2237,7 @@
           <p:cNvPr id="3" name="Marcador de contenido 2">
             <a:extLst>
               <a:ext uri="{FF2B5EF4-FFF2-40B4-BE49-F238E27FC236}">
-                <a16:creationId xmlns="" xmlns:a16="http://schemas.microsoft.com/office/drawing/2014/main" id="{69135358-973E-4F29-858A-4C75727043F6}"/>
+                <a16:creationId xmlns:a16="http://schemas.microsoft.com/office/drawing/2014/main" xmlns="" id="{69135358-973E-4F29-858A-4C75727043F6}"/>
               </a:ext>
             </a:extLst>
           </p:cNvPr>
@@ -2326,7 +2327,7 @@
           <p:cNvPr id="4" name="Marcador de texto 3">
             <a:extLst>
               <a:ext uri="{FF2B5EF4-FFF2-40B4-BE49-F238E27FC236}">
-                <a16:creationId xmlns="" xmlns:a16="http://schemas.microsoft.com/office/drawing/2014/main" id="{F1FA2661-0462-4433-90DC-A12960285CEA}"/>
+                <a16:creationId xmlns:a16="http://schemas.microsoft.com/office/drawing/2014/main" xmlns="" id="{F1FA2661-0462-4433-90DC-A12960285CEA}"/>
               </a:ext>
             </a:extLst>
           </p:cNvPr>
@@ -2397,7 +2398,7 @@
           <p:cNvPr id="5" name="Marcador de fecha 4">
             <a:extLst>
               <a:ext uri="{FF2B5EF4-FFF2-40B4-BE49-F238E27FC236}">
-                <a16:creationId xmlns="" xmlns:a16="http://schemas.microsoft.com/office/drawing/2014/main" id="{49AD787B-F459-4052-B553-CF5A494DB782}"/>
+                <a16:creationId xmlns:a16="http://schemas.microsoft.com/office/drawing/2014/main" xmlns="" id="{49AD787B-F459-4052-B553-CF5A494DB782}"/>
               </a:ext>
             </a:extLst>
           </p:cNvPr>
@@ -2416,7 +2417,7 @@
             <a:fld id="{EFBC5A1B-75D9-4BC9-8C41-860857045191}" type="datetimeFigureOut">
               <a:rPr lang="es-ES" smtClean="0"/>
               <a:pPr/>
-              <a:t>31/12/2022</a:t>
+              <a:t>17/01/2024</a:t>
             </a:fld>
             <a:endParaRPr lang="es-ES"/>
           </a:p>
@@ -2427,7 +2428,7 @@
           <p:cNvPr id="6" name="Marcador de pie de página 5">
             <a:extLst>
               <a:ext uri="{FF2B5EF4-FFF2-40B4-BE49-F238E27FC236}">
-                <a16:creationId xmlns="" xmlns:a16="http://schemas.microsoft.com/office/drawing/2014/main" id="{382BE518-0B2A-4A03-AACE-B9DE17D076CB}"/>
+                <a16:creationId xmlns:a16="http://schemas.microsoft.com/office/drawing/2014/main" xmlns="" id="{382BE518-0B2A-4A03-AACE-B9DE17D076CB}"/>
               </a:ext>
             </a:extLst>
           </p:cNvPr>
@@ -2452,7 +2453,7 @@
           <p:cNvPr id="7" name="Marcador de número de diapositiva 6">
             <a:extLst>
               <a:ext uri="{FF2B5EF4-FFF2-40B4-BE49-F238E27FC236}">
-                <a16:creationId xmlns="" xmlns:a16="http://schemas.microsoft.com/office/drawing/2014/main" id="{3A808C19-9692-46CC-B81D-3AB421594BFD}"/>
+                <a16:creationId xmlns:a16="http://schemas.microsoft.com/office/drawing/2014/main" xmlns="" id="{3A808C19-9692-46CC-B81D-3AB421594BFD}"/>
               </a:ext>
             </a:extLst>
           </p:cNvPr>
@@ -2480,7 +2481,7 @@
     </p:spTree>
     <p:extLst>
       <p:ext uri="{BB962C8B-B14F-4D97-AF65-F5344CB8AC3E}">
-        <p14:creationId xmlns="" xmlns:p14="http://schemas.microsoft.com/office/powerpoint/2010/main" val="1899574245"/>
+        <p14:creationId xmlns:p14="http://schemas.microsoft.com/office/powerpoint/2010/main" xmlns="" val="1899574245"/>
       </p:ext>
     </p:extLst>
   </p:cSld>
@@ -2512,7 +2513,7 @@
           <p:cNvPr id="2" name="Título 1">
             <a:extLst>
               <a:ext uri="{FF2B5EF4-FFF2-40B4-BE49-F238E27FC236}">
-                <a16:creationId xmlns="" xmlns:a16="http://schemas.microsoft.com/office/drawing/2014/main" id="{5AD62FD5-B09C-4A87-8537-735604610918}"/>
+                <a16:creationId xmlns:a16="http://schemas.microsoft.com/office/drawing/2014/main" xmlns="" id="{5AD62FD5-B09C-4A87-8537-735604610918}"/>
               </a:ext>
             </a:extLst>
           </p:cNvPr>
@@ -2549,7 +2550,7 @@
           <p:cNvPr id="3" name="Marcador de posición de imagen 2">
             <a:extLst>
               <a:ext uri="{FF2B5EF4-FFF2-40B4-BE49-F238E27FC236}">
-                <a16:creationId xmlns="" xmlns:a16="http://schemas.microsoft.com/office/drawing/2014/main" id="{B3D90944-8F4E-47BC-BD69-8E893730E0D2}"/>
+                <a16:creationId xmlns:a16="http://schemas.microsoft.com/office/drawing/2014/main" xmlns="" id="{B3D90944-8F4E-47BC-BD69-8E893730E0D2}"/>
               </a:ext>
             </a:extLst>
           </p:cNvPr>
@@ -2616,7 +2617,7 @@
           <p:cNvPr id="4" name="Marcador de texto 3">
             <a:extLst>
               <a:ext uri="{FF2B5EF4-FFF2-40B4-BE49-F238E27FC236}">
-                <a16:creationId xmlns="" xmlns:a16="http://schemas.microsoft.com/office/drawing/2014/main" id="{094847E1-7783-460E-A2B7-D41F0DC2755F}"/>
+                <a16:creationId xmlns:a16="http://schemas.microsoft.com/office/drawing/2014/main" xmlns="" id="{094847E1-7783-460E-A2B7-D41F0DC2755F}"/>
               </a:ext>
             </a:extLst>
           </p:cNvPr>
@@ -2687,7 +2688,7 @@
           <p:cNvPr id="5" name="Marcador de fecha 4">
             <a:extLst>
               <a:ext uri="{FF2B5EF4-FFF2-40B4-BE49-F238E27FC236}">
-                <a16:creationId xmlns="" xmlns:a16="http://schemas.microsoft.com/office/drawing/2014/main" id="{28A8DEFC-7F7E-47C5-85E7-E75878DFD550}"/>
+                <a16:creationId xmlns:a16="http://schemas.microsoft.com/office/drawing/2014/main" xmlns="" id="{28A8DEFC-7F7E-47C5-85E7-E75878DFD550}"/>
               </a:ext>
             </a:extLst>
           </p:cNvPr>
@@ -2706,7 +2707,7 @@
             <a:fld id="{EFBC5A1B-75D9-4BC9-8C41-860857045191}" type="datetimeFigureOut">
               <a:rPr lang="es-ES" smtClean="0"/>
               <a:pPr/>
-              <a:t>31/12/2022</a:t>
+              <a:t>17/01/2024</a:t>
             </a:fld>
             <a:endParaRPr lang="es-ES"/>
           </a:p>
@@ -2717,7 +2718,7 @@
           <p:cNvPr id="6" name="Marcador de pie de página 5">
             <a:extLst>
               <a:ext uri="{FF2B5EF4-FFF2-40B4-BE49-F238E27FC236}">
-                <a16:creationId xmlns="" xmlns:a16="http://schemas.microsoft.com/office/drawing/2014/main" id="{6108570B-8B55-4DD4-ADE5-4F45C0073E55}"/>
+                <a16:creationId xmlns:a16="http://schemas.microsoft.com/office/drawing/2014/main" xmlns="" id="{6108570B-8B55-4DD4-ADE5-4F45C0073E55}"/>
               </a:ext>
             </a:extLst>
           </p:cNvPr>
@@ -2742,7 +2743,7 @@
           <p:cNvPr id="7" name="Marcador de número de diapositiva 6">
             <a:extLst>
               <a:ext uri="{FF2B5EF4-FFF2-40B4-BE49-F238E27FC236}">
-                <a16:creationId xmlns="" xmlns:a16="http://schemas.microsoft.com/office/drawing/2014/main" id="{46E94416-1E50-4C95-B4AF-F8B12D885D43}"/>
+                <a16:creationId xmlns:a16="http://schemas.microsoft.com/office/drawing/2014/main" xmlns="" id="{46E94416-1E50-4C95-B4AF-F8B12D885D43}"/>
               </a:ext>
             </a:extLst>
           </p:cNvPr>
@@ -2770,7 +2771,7 @@
     </p:spTree>
     <p:extLst>
       <p:ext uri="{BB962C8B-B14F-4D97-AF65-F5344CB8AC3E}">
-        <p14:creationId xmlns="" xmlns:p14="http://schemas.microsoft.com/office/powerpoint/2010/main" val="1689888809"/>
+        <p14:creationId xmlns:p14="http://schemas.microsoft.com/office/powerpoint/2010/main" xmlns="" val="1689888809"/>
       </p:ext>
     </p:extLst>
   </p:cSld>
@@ -2807,7 +2808,7 @@
           <p:cNvPr id="2" name="Marcador de título 1">
             <a:extLst>
               <a:ext uri="{FF2B5EF4-FFF2-40B4-BE49-F238E27FC236}">
-                <a16:creationId xmlns="" xmlns:a16="http://schemas.microsoft.com/office/drawing/2014/main" id="{1C4EA66B-8008-4E62-B470-D012372D9C54}"/>
+                <a16:creationId xmlns:a16="http://schemas.microsoft.com/office/drawing/2014/main" xmlns="" id="{1C4EA66B-8008-4E62-B470-D012372D9C54}"/>
               </a:ext>
             </a:extLst>
           </p:cNvPr>
@@ -2845,7 +2846,7 @@
           <p:cNvPr id="3" name="Marcador de texto 2">
             <a:extLst>
               <a:ext uri="{FF2B5EF4-FFF2-40B4-BE49-F238E27FC236}">
-                <a16:creationId xmlns="" xmlns:a16="http://schemas.microsoft.com/office/drawing/2014/main" id="{932AAA69-39C0-42B4-B0CB-603BEA360F90}"/>
+                <a16:creationId xmlns:a16="http://schemas.microsoft.com/office/drawing/2014/main" xmlns="" id="{932AAA69-39C0-42B4-B0CB-603BEA360F90}"/>
               </a:ext>
             </a:extLst>
           </p:cNvPr>
@@ -2912,7 +2913,7 @@
           <p:cNvPr id="4" name="Marcador de fecha 3">
             <a:extLst>
               <a:ext uri="{FF2B5EF4-FFF2-40B4-BE49-F238E27FC236}">
-                <a16:creationId xmlns="" xmlns:a16="http://schemas.microsoft.com/office/drawing/2014/main" id="{336B4845-2F33-4E2B-820D-DFDA0715031A}"/>
+                <a16:creationId xmlns:a16="http://schemas.microsoft.com/office/drawing/2014/main" xmlns="" id="{336B4845-2F33-4E2B-820D-DFDA0715031A}"/>
               </a:ext>
             </a:extLst>
           </p:cNvPr>
@@ -2949,7 +2950,7 @@
             <a:fld id="{EFBC5A1B-75D9-4BC9-8C41-860857045191}" type="datetimeFigureOut">
               <a:rPr lang="es-ES" smtClean="0"/>
               <a:pPr/>
-              <a:t>31/12/2022</a:t>
+              <a:t>17/01/2024</a:t>
             </a:fld>
             <a:endParaRPr lang="es-ES"/>
           </a:p>
@@ -2960,7 +2961,7 @@
           <p:cNvPr id="5" name="Marcador de pie de página 4">
             <a:extLst>
               <a:ext uri="{FF2B5EF4-FFF2-40B4-BE49-F238E27FC236}">
-                <a16:creationId xmlns="" xmlns:a16="http://schemas.microsoft.com/office/drawing/2014/main" id="{2377ABD5-FE97-43F4-9196-F24C9B97CADB}"/>
+                <a16:creationId xmlns:a16="http://schemas.microsoft.com/office/drawing/2014/main" xmlns="" id="{2377ABD5-FE97-43F4-9196-F24C9B97CADB}"/>
               </a:ext>
             </a:extLst>
           </p:cNvPr>
@@ -3003,7 +3004,7 @@
           <p:cNvPr id="6" name="Marcador de número de diapositiva 5">
             <a:extLst>
               <a:ext uri="{FF2B5EF4-FFF2-40B4-BE49-F238E27FC236}">
-                <a16:creationId xmlns="" xmlns:a16="http://schemas.microsoft.com/office/drawing/2014/main" id="{A20E76EC-D35B-45EB-B53D-F96C980103A1}"/>
+                <a16:creationId xmlns:a16="http://schemas.microsoft.com/office/drawing/2014/main" xmlns="" id="{A20E76EC-D35B-45EB-B53D-F96C980103A1}"/>
               </a:ext>
             </a:extLst>
           </p:cNvPr>
@@ -3049,7 +3050,7 @@
     </p:spTree>
     <p:extLst>
       <p:ext uri="{BB962C8B-B14F-4D97-AF65-F5344CB8AC3E}">
-        <p14:creationId xmlns="" xmlns:p14="http://schemas.microsoft.com/office/powerpoint/2010/main" val="3258147845"/>
+        <p14:creationId xmlns:p14="http://schemas.microsoft.com/office/powerpoint/2010/main" xmlns="" val="3258147845"/>
       </p:ext>
     </p:extLst>
   </p:cSld>
@@ -3435,7 +3436,7 @@
           <p:cNvPr id="33" name="17 Rectángulo redondeado">
             <a:extLst>
               <a:ext uri="{FF2B5EF4-FFF2-40B4-BE49-F238E27FC236}">
-                <a16:creationId xmlns="" xmlns:a16="http://schemas.microsoft.com/office/drawing/2014/main" id="{8F3B96F0-FFCD-4FEA-B461-D7A34C8072F4}"/>
+                <a16:creationId xmlns:a16="http://schemas.microsoft.com/office/drawing/2014/main" xmlns="" id="{8F3B96F0-FFCD-4FEA-B461-D7A34C8072F4}"/>
               </a:ext>
             </a:extLst>
           </p:cNvPr>
@@ -3492,7 +3493,7 @@
           <p:cNvPr id="43" name="29 Rectángulo redondeado">
             <a:extLst>
               <a:ext uri="{FF2B5EF4-FFF2-40B4-BE49-F238E27FC236}">
-                <a16:creationId xmlns="" xmlns:a16="http://schemas.microsoft.com/office/drawing/2014/main" id="{4FAB1564-3349-46FD-B549-B071A89FF9A1}"/>
+                <a16:creationId xmlns:a16="http://schemas.microsoft.com/office/drawing/2014/main" xmlns="" id="{4FAB1564-3349-46FD-B549-B071A89FF9A1}"/>
               </a:ext>
             </a:extLst>
           </p:cNvPr>
@@ -3549,7 +3550,7 @@
           <p:cNvPr id="44" name="24 Rectángulo redondeado">
             <a:extLst>
               <a:ext uri="{FF2B5EF4-FFF2-40B4-BE49-F238E27FC236}">
-                <a16:creationId xmlns="" xmlns:a16="http://schemas.microsoft.com/office/drawing/2014/main" id="{9BC53101-F1E5-4084-8AE2-31419AEFF918}"/>
+                <a16:creationId xmlns:a16="http://schemas.microsoft.com/office/drawing/2014/main" xmlns="" id="{9BC53101-F1E5-4084-8AE2-31419AEFF918}"/>
               </a:ext>
             </a:extLst>
           </p:cNvPr>
@@ -3611,7 +3612,7 @@
           <p:cNvPr id="45" name="Rectángulo: esquinas redondeadas 44">
             <a:extLst>
               <a:ext uri="{FF2B5EF4-FFF2-40B4-BE49-F238E27FC236}">
-                <a16:creationId xmlns="" xmlns:a16="http://schemas.microsoft.com/office/drawing/2014/main" id="{49F1DBF7-AD08-4AFA-85B8-84F292D2C132}"/>
+                <a16:creationId xmlns:a16="http://schemas.microsoft.com/office/drawing/2014/main" xmlns="" id="{49F1DBF7-AD08-4AFA-85B8-84F292D2C132}"/>
               </a:ext>
             </a:extLst>
           </p:cNvPr>
@@ -3683,7 +3684,7 @@
           <p:cNvPr id="46" name="24 Rectángulo redondeado">
             <a:extLst>
               <a:ext uri="{FF2B5EF4-FFF2-40B4-BE49-F238E27FC236}">
-                <a16:creationId xmlns="" xmlns:a16="http://schemas.microsoft.com/office/drawing/2014/main" id="{E8048C8F-65ED-423A-81BB-F9A03CDAD52C}"/>
+                <a16:creationId xmlns:a16="http://schemas.microsoft.com/office/drawing/2014/main" xmlns="" id="{E8048C8F-65ED-423A-81BB-F9A03CDAD52C}"/>
               </a:ext>
             </a:extLst>
           </p:cNvPr>
@@ -3741,7 +3742,7 @@
           <p:cNvPr id="47" name="24 Rectángulo redondeado">
             <a:extLst>
               <a:ext uri="{FF2B5EF4-FFF2-40B4-BE49-F238E27FC236}">
-                <a16:creationId xmlns="" xmlns:a16="http://schemas.microsoft.com/office/drawing/2014/main" id="{F73B65AD-B42B-4069-8B40-0C63F934B343}"/>
+                <a16:creationId xmlns:a16="http://schemas.microsoft.com/office/drawing/2014/main" xmlns="" id="{F73B65AD-B42B-4069-8B40-0C63F934B343}"/>
               </a:ext>
             </a:extLst>
           </p:cNvPr>
@@ -3807,7 +3808,7 @@
           <p:cNvPr id="59" name="CuadroTexto 58">
             <a:extLst>
               <a:ext uri="{FF2B5EF4-FFF2-40B4-BE49-F238E27FC236}">
-                <a16:creationId xmlns="" xmlns:a16="http://schemas.microsoft.com/office/drawing/2014/main" id="{5A1D2FEE-BC7E-4255-A037-95CCA5998751}"/>
+                <a16:creationId xmlns:a16="http://schemas.microsoft.com/office/drawing/2014/main" xmlns="" id="{5A1D2FEE-BC7E-4255-A037-95CCA5998751}"/>
               </a:ext>
             </a:extLst>
           </p:cNvPr>
@@ -3850,7 +3851,7 @@
           <p:cNvPr id="60" name="CuadroTexto 59">
             <a:extLst>
               <a:ext uri="{FF2B5EF4-FFF2-40B4-BE49-F238E27FC236}">
-                <a16:creationId xmlns="" xmlns:a16="http://schemas.microsoft.com/office/drawing/2014/main" id="{118416F3-97C4-4518-8F13-E57BA0098A37}"/>
+                <a16:creationId xmlns:a16="http://schemas.microsoft.com/office/drawing/2014/main" xmlns="" id="{118416F3-97C4-4518-8F13-E57BA0098A37}"/>
               </a:ext>
             </a:extLst>
           </p:cNvPr>
@@ -3893,7 +3894,7 @@
           <p:cNvPr id="62" name="CuadroTexto 61">
             <a:extLst>
               <a:ext uri="{FF2B5EF4-FFF2-40B4-BE49-F238E27FC236}">
-                <a16:creationId xmlns="" xmlns:a16="http://schemas.microsoft.com/office/drawing/2014/main" id="{951A2C70-E705-4FA8-903D-F2EB33879676}"/>
+                <a16:creationId xmlns:a16="http://schemas.microsoft.com/office/drawing/2014/main" xmlns="" id="{951A2C70-E705-4FA8-903D-F2EB33879676}"/>
               </a:ext>
             </a:extLst>
           </p:cNvPr>
@@ -4014,7 +4015,7 @@
           <p:cNvPr id="65" name="24 Rectángulo redondeado">
             <a:extLst>
               <a:ext uri="{FF2B5EF4-FFF2-40B4-BE49-F238E27FC236}">
-                <a16:creationId xmlns="" xmlns:a16="http://schemas.microsoft.com/office/drawing/2014/main" id="{E8048C8F-65ED-423A-81BB-F9A03CDAD52C}"/>
+                <a16:creationId xmlns:a16="http://schemas.microsoft.com/office/drawing/2014/main" xmlns="" id="{E8048C8F-65ED-423A-81BB-F9A03CDAD52C}"/>
               </a:ext>
             </a:extLst>
           </p:cNvPr>
@@ -4072,7 +4073,7 @@
           <p:cNvPr id="66" name="24 Rectángulo redondeado">
             <a:extLst>
               <a:ext uri="{FF2B5EF4-FFF2-40B4-BE49-F238E27FC236}">
-                <a16:creationId xmlns="" xmlns:a16="http://schemas.microsoft.com/office/drawing/2014/main" id="{E8048C8F-65ED-423A-81BB-F9A03CDAD52C}"/>
+                <a16:creationId xmlns:a16="http://schemas.microsoft.com/office/drawing/2014/main" xmlns="" id="{E8048C8F-65ED-423A-81BB-F9A03CDAD52C}"/>
               </a:ext>
             </a:extLst>
           </p:cNvPr>
@@ -4130,7 +4131,7 @@
           <p:cNvPr id="67" name="24 Rectángulo redondeado">
             <a:extLst>
               <a:ext uri="{FF2B5EF4-FFF2-40B4-BE49-F238E27FC236}">
-                <a16:creationId xmlns="" xmlns:a16="http://schemas.microsoft.com/office/drawing/2014/main" id="{E8048C8F-65ED-423A-81BB-F9A03CDAD52C}"/>
+                <a16:creationId xmlns:a16="http://schemas.microsoft.com/office/drawing/2014/main" xmlns="" id="{E8048C8F-65ED-423A-81BB-F9A03CDAD52C}"/>
               </a:ext>
             </a:extLst>
           </p:cNvPr>
@@ -4793,7 +4794,7 @@
           <p:cNvPr id="119" name="CuadroTexto 26">
             <a:extLst>
               <a:ext uri="{FF2B5EF4-FFF2-40B4-BE49-F238E27FC236}">
-                <a16:creationId xmlns="" xmlns:a16="http://schemas.microsoft.com/office/drawing/2014/main" id="{91083145-8B20-4DC2-B0C8-80BA773F821D}"/>
+                <a16:creationId xmlns:a16="http://schemas.microsoft.com/office/drawing/2014/main" xmlns="" id="{91083145-8B20-4DC2-B0C8-80BA773F821D}"/>
               </a:ext>
             </a:extLst>
           </p:cNvPr>
@@ -5174,7 +5175,7 @@
     </p:spTree>
     <p:extLst>
       <p:ext uri="{BB962C8B-B14F-4D97-AF65-F5344CB8AC3E}">
-        <p14:creationId xmlns="" xmlns:p14="http://schemas.microsoft.com/office/powerpoint/2010/main" val="3578574719"/>
+        <p14:creationId xmlns:p14="http://schemas.microsoft.com/office/powerpoint/2010/main" xmlns="" val="3578574719"/>
       </p:ext>
     </p:extLst>
   </p:cSld>
@@ -7365,7 +7366,7 @@
           <p:cNvPr id="70" name="CuadroTexto 26">
             <a:extLst>
               <a:ext uri="{FF2B5EF4-FFF2-40B4-BE49-F238E27FC236}">
-                <a16:creationId xmlns="" xmlns:a16="http://schemas.microsoft.com/office/drawing/2014/main" id="{91083145-8B20-4DC2-B0C8-80BA773F821D}"/>
+                <a16:creationId xmlns:a16="http://schemas.microsoft.com/office/drawing/2014/main" xmlns="" id="{91083145-8B20-4DC2-B0C8-80BA773F821D}"/>
               </a:ext>
             </a:extLst>
           </p:cNvPr>
@@ -7409,7 +7410,7 @@
           <p:cNvPr id="71" name="CuadroTexto 26">
             <a:extLst>
               <a:ext uri="{FF2B5EF4-FFF2-40B4-BE49-F238E27FC236}">
-                <a16:creationId xmlns="" xmlns:a16="http://schemas.microsoft.com/office/drawing/2014/main" id="{91083145-8B20-4DC2-B0C8-80BA773F821D}"/>
+                <a16:creationId xmlns:a16="http://schemas.microsoft.com/office/drawing/2014/main" xmlns="" id="{91083145-8B20-4DC2-B0C8-80BA773F821D}"/>
               </a:ext>
             </a:extLst>
           </p:cNvPr>
@@ -7562,7 +7563,7 @@
           <p:cNvPr id="83" name="CuadroTexto 26">
             <a:extLst>
               <a:ext uri="{FF2B5EF4-FFF2-40B4-BE49-F238E27FC236}">
-                <a16:creationId xmlns="" xmlns:a16="http://schemas.microsoft.com/office/drawing/2014/main" id="{91083145-8B20-4DC2-B0C8-80BA773F821D}"/>
+                <a16:creationId xmlns:a16="http://schemas.microsoft.com/office/drawing/2014/main" xmlns="" id="{91083145-8B20-4DC2-B0C8-80BA773F821D}"/>
               </a:ext>
             </a:extLst>
           </p:cNvPr>
@@ -7613,7 +7614,7 @@
           <p:cNvPr id="85" name="CuadroTexto 26">
             <a:extLst>
               <a:ext uri="{FF2B5EF4-FFF2-40B4-BE49-F238E27FC236}">
-                <a16:creationId xmlns="" xmlns:a16="http://schemas.microsoft.com/office/drawing/2014/main" id="{91083145-8B20-4DC2-B0C8-80BA773F821D}"/>
+                <a16:creationId xmlns:a16="http://schemas.microsoft.com/office/drawing/2014/main" xmlns="" id="{91083145-8B20-4DC2-B0C8-80BA773F821D}"/>
               </a:ext>
             </a:extLst>
           </p:cNvPr>
@@ -9052,6 +9053,921 @@
       </p:grpSpPr>
       <p:sp>
         <p:nvSpPr>
+          <p:cNvPr id="5" name="4 Rectángulo redondeado"/>
+          <p:cNvSpPr/>
+          <p:nvPr/>
+        </p:nvSpPr>
+        <p:spPr>
+          <a:xfrm>
+            <a:off x="2603612" y="1844824"/>
+            <a:ext cx="1288630" cy="2270444"/>
+          </a:xfrm>
+          <a:prstGeom prst="roundRect">
+            <a:avLst>
+              <a:gd name="adj" fmla="val 11068"/>
+            </a:avLst>
+          </a:prstGeom>
+          <a:solidFill>
+            <a:schemeClr val="bg1">
+              <a:lumMod val="65000"/>
+            </a:schemeClr>
+          </a:solidFill>
+          <a:ln w="76200">
+            <a:solidFill>
+              <a:schemeClr val="tx1"/>
+            </a:solidFill>
+          </a:ln>
+        </p:spPr>
+        <p:style>
+          <a:lnRef idx="2">
+            <a:schemeClr val="accent1">
+              <a:shade val="50000"/>
+            </a:schemeClr>
+          </a:lnRef>
+          <a:fillRef idx="1">
+            <a:schemeClr val="accent1"/>
+          </a:fillRef>
+          <a:effectRef idx="0">
+            <a:schemeClr val="accent1"/>
+          </a:effectRef>
+          <a:fontRef idx="minor">
+            <a:schemeClr val="lt1"/>
+          </a:fontRef>
+        </p:style>
+        <p:txBody>
+          <a:bodyPr rtlCol="0" anchor="ctr"/>
+          <a:lstStyle/>
+          <a:p>
+            <a:pPr algn="ctr"/>
+            <a:endParaRPr lang="es-ES"/>
+          </a:p>
+        </p:txBody>
+      </p:sp>
+      <p:sp>
+        <p:nvSpPr>
+          <p:cNvPr id="6" name="5 Elipse"/>
+          <p:cNvSpPr/>
+          <p:nvPr/>
+        </p:nvSpPr>
+        <p:spPr>
+          <a:xfrm>
+            <a:off x="2971792" y="2213004"/>
+            <a:ext cx="552270" cy="552270"/>
+          </a:xfrm>
+          <a:prstGeom prst="ellipse">
+            <a:avLst/>
+          </a:prstGeom>
+          <a:solidFill>
+            <a:schemeClr val="tx1">
+              <a:lumMod val="75000"/>
+              <a:lumOff val="25000"/>
+            </a:schemeClr>
+          </a:solidFill>
+          <a:ln w="76200">
+            <a:solidFill>
+              <a:schemeClr val="tx1"/>
+            </a:solidFill>
+          </a:ln>
+        </p:spPr>
+        <p:style>
+          <a:lnRef idx="2">
+            <a:schemeClr val="accent1">
+              <a:shade val="50000"/>
+            </a:schemeClr>
+          </a:lnRef>
+          <a:fillRef idx="1">
+            <a:schemeClr val="accent1"/>
+          </a:fillRef>
+          <a:effectRef idx="0">
+            <a:schemeClr val="accent1"/>
+          </a:effectRef>
+          <a:fontRef idx="minor">
+            <a:schemeClr val="lt1"/>
+          </a:fontRef>
+        </p:style>
+        <p:txBody>
+          <a:bodyPr rtlCol="0" anchor="ctr"/>
+          <a:lstStyle/>
+          <a:p>
+            <a:pPr algn="ctr"/>
+            <a:endParaRPr lang="es-ES"/>
+          </a:p>
+        </p:txBody>
+      </p:sp>
+      <p:sp>
+        <p:nvSpPr>
+          <p:cNvPr id="7" name="6 Elipse"/>
+          <p:cNvSpPr/>
+          <p:nvPr/>
+        </p:nvSpPr>
+        <p:spPr>
+          <a:xfrm>
+            <a:off x="2849065" y="3072091"/>
+            <a:ext cx="797723" cy="797723"/>
+          </a:xfrm>
+          <a:prstGeom prst="ellipse">
+            <a:avLst/>
+          </a:prstGeom>
+          <a:solidFill>
+            <a:schemeClr val="tx1">
+              <a:lumMod val="75000"/>
+              <a:lumOff val="25000"/>
+            </a:schemeClr>
+          </a:solidFill>
+          <a:ln w="76200">
+            <a:solidFill>
+              <a:schemeClr val="tx1"/>
+            </a:solidFill>
+          </a:ln>
+        </p:spPr>
+        <p:style>
+          <a:lnRef idx="2">
+            <a:schemeClr val="accent1">
+              <a:shade val="50000"/>
+            </a:schemeClr>
+          </a:lnRef>
+          <a:fillRef idx="1">
+            <a:schemeClr val="accent1"/>
+          </a:fillRef>
+          <a:effectRef idx="0">
+            <a:schemeClr val="accent1"/>
+          </a:effectRef>
+          <a:fontRef idx="minor">
+            <a:schemeClr val="lt1"/>
+          </a:fontRef>
+        </p:style>
+        <p:txBody>
+          <a:bodyPr rtlCol="0" anchor="ctr"/>
+          <a:lstStyle/>
+          <a:p>
+            <a:pPr algn="ctr"/>
+            <a:endParaRPr lang="es-ES"/>
+          </a:p>
+        </p:txBody>
+      </p:sp>
+      <p:sp>
+        <p:nvSpPr>
+          <p:cNvPr id="8" name="7 Elipse"/>
+          <p:cNvSpPr/>
+          <p:nvPr/>
+        </p:nvSpPr>
+        <p:spPr>
+          <a:xfrm>
+            <a:off x="2971792" y="3194817"/>
+            <a:ext cx="552270" cy="552270"/>
+          </a:xfrm>
+          <a:prstGeom prst="ellipse">
+            <a:avLst/>
+          </a:prstGeom>
+          <a:solidFill>
+            <a:schemeClr val="tx1">
+              <a:lumMod val="75000"/>
+              <a:lumOff val="25000"/>
+            </a:schemeClr>
+          </a:solidFill>
+          <a:ln w="76200">
+            <a:solidFill>
+              <a:schemeClr val="tx1"/>
+            </a:solidFill>
+          </a:ln>
+        </p:spPr>
+        <p:style>
+          <a:lnRef idx="2">
+            <a:schemeClr val="accent1">
+              <a:shade val="50000"/>
+            </a:schemeClr>
+          </a:lnRef>
+          <a:fillRef idx="1">
+            <a:schemeClr val="accent1"/>
+          </a:fillRef>
+          <a:effectRef idx="0">
+            <a:schemeClr val="accent1"/>
+          </a:effectRef>
+          <a:fontRef idx="minor">
+            <a:schemeClr val="lt1"/>
+          </a:fontRef>
+        </p:style>
+        <p:txBody>
+          <a:bodyPr rtlCol="0" anchor="ctr"/>
+          <a:lstStyle/>
+          <a:p>
+            <a:pPr algn="ctr"/>
+            <a:endParaRPr lang="es-ES"/>
+          </a:p>
+        </p:txBody>
+      </p:sp>
+      <p:sp>
+        <p:nvSpPr>
+          <p:cNvPr id="9" name="8 Rectángulo redondeado"/>
+          <p:cNvSpPr/>
+          <p:nvPr/>
+        </p:nvSpPr>
+        <p:spPr>
+          <a:xfrm>
+            <a:off x="8371766" y="1844824"/>
+            <a:ext cx="1288630" cy="2270444"/>
+          </a:xfrm>
+          <a:prstGeom prst="roundRect">
+            <a:avLst>
+              <a:gd name="adj" fmla="val 11068"/>
+            </a:avLst>
+          </a:prstGeom>
+          <a:solidFill>
+            <a:schemeClr val="bg1">
+              <a:lumMod val="65000"/>
+            </a:schemeClr>
+          </a:solidFill>
+          <a:ln w="76200">
+            <a:solidFill>
+              <a:schemeClr val="tx1"/>
+            </a:solidFill>
+          </a:ln>
+        </p:spPr>
+        <p:style>
+          <a:lnRef idx="2">
+            <a:schemeClr val="accent1">
+              <a:shade val="50000"/>
+            </a:schemeClr>
+          </a:lnRef>
+          <a:fillRef idx="1">
+            <a:schemeClr val="accent1"/>
+          </a:fillRef>
+          <a:effectRef idx="0">
+            <a:schemeClr val="accent1"/>
+          </a:effectRef>
+          <a:fontRef idx="minor">
+            <a:schemeClr val="lt1"/>
+          </a:fontRef>
+        </p:style>
+        <p:txBody>
+          <a:bodyPr rtlCol="0" anchor="ctr"/>
+          <a:lstStyle/>
+          <a:p>
+            <a:pPr algn="ctr"/>
+            <a:endParaRPr lang="es-ES"/>
+          </a:p>
+        </p:txBody>
+      </p:sp>
+      <p:sp>
+        <p:nvSpPr>
+          <p:cNvPr id="10" name="9 Elipse"/>
+          <p:cNvSpPr/>
+          <p:nvPr/>
+        </p:nvSpPr>
+        <p:spPr>
+          <a:xfrm>
+            <a:off x="8739946" y="2213004"/>
+            <a:ext cx="552270" cy="552270"/>
+          </a:xfrm>
+          <a:prstGeom prst="ellipse">
+            <a:avLst/>
+          </a:prstGeom>
+          <a:solidFill>
+            <a:schemeClr val="tx1">
+              <a:lumMod val="75000"/>
+              <a:lumOff val="25000"/>
+            </a:schemeClr>
+          </a:solidFill>
+          <a:ln w="76200">
+            <a:solidFill>
+              <a:schemeClr val="tx1"/>
+            </a:solidFill>
+          </a:ln>
+        </p:spPr>
+        <p:style>
+          <a:lnRef idx="2">
+            <a:schemeClr val="accent1">
+              <a:shade val="50000"/>
+            </a:schemeClr>
+          </a:lnRef>
+          <a:fillRef idx="1">
+            <a:schemeClr val="accent1"/>
+          </a:fillRef>
+          <a:effectRef idx="0">
+            <a:schemeClr val="accent1"/>
+          </a:effectRef>
+          <a:fontRef idx="minor">
+            <a:schemeClr val="lt1"/>
+          </a:fontRef>
+        </p:style>
+        <p:txBody>
+          <a:bodyPr rtlCol="0" anchor="ctr"/>
+          <a:lstStyle/>
+          <a:p>
+            <a:pPr algn="ctr"/>
+            <a:endParaRPr lang="es-ES"/>
+          </a:p>
+        </p:txBody>
+      </p:sp>
+      <p:sp>
+        <p:nvSpPr>
+          <p:cNvPr id="11" name="10 Elipse"/>
+          <p:cNvSpPr/>
+          <p:nvPr/>
+        </p:nvSpPr>
+        <p:spPr>
+          <a:xfrm>
+            <a:off x="8617219" y="3072091"/>
+            <a:ext cx="797723" cy="797723"/>
+          </a:xfrm>
+          <a:prstGeom prst="ellipse">
+            <a:avLst/>
+          </a:prstGeom>
+          <a:solidFill>
+            <a:schemeClr val="tx1">
+              <a:lumMod val="75000"/>
+              <a:lumOff val="25000"/>
+            </a:schemeClr>
+          </a:solidFill>
+          <a:ln w="76200">
+            <a:solidFill>
+              <a:schemeClr val="tx1"/>
+            </a:solidFill>
+          </a:ln>
+        </p:spPr>
+        <p:style>
+          <a:lnRef idx="2">
+            <a:schemeClr val="accent1">
+              <a:shade val="50000"/>
+            </a:schemeClr>
+          </a:lnRef>
+          <a:fillRef idx="1">
+            <a:schemeClr val="accent1"/>
+          </a:fillRef>
+          <a:effectRef idx="0">
+            <a:schemeClr val="accent1"/>
+          </a:effectRef>
+          <a:fontRef idx="minor">
+            <a:schemeClr val="lt1"/>
+          </a:fontRef>
+        </p:style>
+        <p:txBody>
+          <a:bodyPr rtlCol="0" anchor="ctr"/>
+          <a:lstStyle/>
+          <a:p>
+            <a:pPr algn="ctr"/>
+            <a:endParaRPr lang="es-ES"/>
+          </a:p>
+        </p:txBody>
+      </p:sp>
+      <p:sp>
+        <p:nvSpPr>
+          <p:cNvPr id="12" name="11 Elipse"/>
+          <p:cNvSpPr/>
+          <p:nvPr/>
+        </p:nvSpPr>
+        <p:spPr>
+          <a:xfrm>
+            <a:off x="8739946" y="3194817"/>
+            <a:ext cx="552270" cy="552270"/>
+          </a:xfrm>
+          <a:prstGeom prst="ellipse">
+            <a:avLst/>
+          </a:prstGeom>
+          <a:solidFill>
+            <a:schemeClr val="tx1">
+              <a:lumMod val="75000"/>
+              <a:lumOff val="25000"/>
+            </a:schemeClr>
+          </a:solidFill>
+          <a:ln w="76200">
+            <a:solidFill>
+              <a:schemeClr val="tx1"/>
+            </a:solidFill>
+          </a:ln>
+        </p:spPr>
+        <p:style>
+          <a:lnRef idx="2">
+            <a:schemeClr val="accent1">
+              <a:shade val="50000"/>
+            </a:schemeClr>
+          </a:lnRef>
+          <a:fillRef idx="1">
+            <a:schemeClr val="accent1"/>
+          </a:fillRef>
+          <a:effectRef idx="0">
+            <a:schemeClr val="accent1"/>
+          </a:effectRef>
+          <a:fontRef idx="minor">
+            <a:schemeClr val="lt1"/>
+          </a:fontRef>
+        </p:style>
+        <p:txBody>
+          <a:bodyPr rtlCol="0" anchor="ctr"/>
+          <a:lstStyle/>
+          <a:p>
+            <a:pPr algn="ctr"/>
+            <a:endParaRPr lang="es-ES"/>
+          </a:p>
+        </p:txBody>
+      </p:sp>
+      <p:grpSp>
+        <p:nvGrpSpPr>
+          <p:cNvPr id="13" name="14 Grupo"/>
+          <p:cNvGrpSpPr/>
+          <p:nvPr/>
+        </p:nvGrpSpPr>
+        <p:grpSpPr>
+          <a:xfrm>
+            <a:off x="3339972" y="2151641"/>
+            <a:ext cx="1718173" cy="1718174"/>
+            <a:chOff x="2123728" y="1700808"/>
+            <a:chExt cx="2016224" cy="2016224"/>
+          </a:xfrm>
+        </p:grpSpPr>
+        <p:sp>
+          <p:nvSpPr>
+            <p:cNvPr id="23" name="11 Arco"/>
+            <p:cNvSpPr/>
+            <p:nvPr/>
+          </p:nvSpPr>
+          <p:spPr>
+            <a:xfrm>
+              <a:off x="2699792" y="2276872"/>
+              <a:ext cx="864096" cy="864096"/>
+            </a:xfrm>
+            <a:prstGeom prst="arc">
+              <a:avLst>
+                <a:gd name="adj1" fmla="val 16200000"/>
+                <a:gd name="adj2" fmla="val 5342938"/>
+              </a:avLst>
+            </a:prstGeom>
+            <a:ln w="76200">
+              <a:solidFill>
+                <a:schemeClr val="tx1"/>
+              </a:solidFill>
+            </a:ln>
+          </p:spPr>
+          <p:style>
+            <a:lnRef idx="1">
+              <a:schemeClr val="accent1"/>
+            </a:lnRef>
+            <a:fillRef idx="0">
+              <a:schemeClr val="accent1"/>
+            </a:fillRef>
+            <a:effectRef idx="0">
+              <a:schemeClr val="accent1"/>
+            </a:effectRef>
+            <a:fontRef idx="minor">
+              <a:schemeClr val="tx1"/>
+            </a:fontRef>
+          </p:style>
+          <p:txBody>
+            <a:bodyPr rtlCol="0" anchor="ctr"/>
+            <a:lstStyle/>
+            <a:p>
+              <a:pPr algn="ctr"/>
+              <a:endParaRPr lang="es-ES"/>
+            </a:p>
+          </p:txBody>
+        </p:sp>
+        <p:sp>
+          <p:nvSpPr>
+            <p:cNvPr id="24" name="12 Arco"/>
+            <p:cNvSpPr/>
+            <p:nvPr/>
+          </p:nvSpPr>
+          <p:spPr>
+            <a:xfrm>
+              <a:off x="2411760" y="1988840"/>
+              <a:ext cx="1440160" cy="1440160"/>
+            </a:xfrm>
+            <a:prstGeom prst="arc">
+              <a:avLst>
+                <a:gd name="adj1" fmla="val 16200000"/>
+                <a:gd name="adj2" fmla="val 5342938"/>
+              </a:avLst>
+            </a:prstGeom>
+            <a:ln w="76200">
+              <a:solidFill>
+                <a:schemeClr val="tx1"/>
+              </a:solidFill>
+            </a:ln>
+          </p:spPr>
+          <p:style>
+            <a:lnRef idx="1">
+              <a:schemeClr val="accent1"/>
+            </a:lnRef>
+            <a:fillRef idx="0">
+              <a:schemeClr val="accent1"/>
+            </a:fillRef>
+            <a:effectRef idx="0">
+              <a:schemeClr val="accent1"/>
+            </a:effectRef>
+            <a:fontRef idx="minor">
+              <a:schemeClr val="tx1"/>
+            </a:fontRef>
+          </p:style>
+          <p:txBody>
+            <a:bodyPr rtlCol="0" anchor="ctr"/>
+            <a:lstStyle/>
+            <a:p>
+              <a:pPr algn="ctr"/>
+              <a:endParaRPr lang="es-ES"/>
+            </a:p>
+          </p:txBody>
+        </p:sp>
+        <p:sp>
+          <p:nvSpPr>
+            <p:cNvPr id="25" name="24 Arco"/>
+            <p:cNvSpPr/>
+            <p:nvPr/>
+          </p:nvSpPr>
+          <p:spPr>
+            <a:xfrm>
+              <a:off x="2123728" y="1700808"/>
+              <a:ext cx="2016224" cy="2016224"/>
+            </a:xfrm>
+            <a:prstGeom prst="arc">
+              <a:avLst>
+                <a:gd name="adj1" fmla="val 16200000"/>
+                <a:gd name="adj2" fmla="val 5342938"/>
+              </a:avLst>
+            </a:prstGeom>
+            <a:ln w="76200">
+              <a:solidFill>
+                <a:schemeClr val="tx1"/>
+              </a:solidFill>
+            </a:ln>
+          </p:spPr>
+          <p:style>
+            <a:lnRef idx="1">
+              <a:schemeClr val="accent1"/>
+            </a:lnRef>
+            <a:fillRef idx="0">
+              <a:schemeClr val="accent1"/>
+            </a:fillRef>
+            <a:effectRef idx="0">
+              <a:schemeClr val="accent1"/>
+            </a:effectRef>
+            <a:fontRef idx="minor">
+              <a:schemeClr val="tx1"/>
+            </a:fontRef>
+          </p:style>
+          <p:txBody>
+            <a:bodyPr rtlCol="0" anchor="ctr"/>
+            <a:lstStyle/>
+            <a:p>
+              <a:pPr algn="ctr"/>
+              <a:endParaRPr lang="es-ES"/>
+            </a:p>
+          </p:txBody>
+        </p:sp>
+      </p:grpSp>
+      <p:grpSp>
+        <p:nvGrpSpPr>
+          <p:cNvPr id="14" name="15 Grupo"/>
+          <p:cNvGrpSpPr/>
+          <p:nvPr/>
+        </p:nvGrpSpPr>
+        <p:grpSpPr>
+          <a:xfrm rot="10800000">
+            <a:off x="7205862" y="2151641"/>
+            <a:ext cx="1718173" cy="1718174"/>
+            <a:chOff x="2123728" y="1700808"/>
+            <a:chExt cx="2016224" cy="2016224"/>
+          </a:xfrm>
+        </p:grpSpPr>
+        <p:sp>
+          <p:nvSpPr>
+            <p:cNvPr id="20" name="19 Arco"/>
+            <p:cNvSpPr/>
+            <p:nvPr/>
+          </p:nvSpPr>
+          <p:spPr>
+            <a:xfrm>
+              <a:off x="2699792" y="2276872"/>
+              <a:ext cx="864096" cy="864096"/>
+            </a:xfrm>
+            <a:prstGeom prst="arc">
+              <a:avLst>
+                <a:gd name="adj1" fmla="val 16200000"/>
+                <a:gd name="adj2" fmla="val 5342938"/>
+              </a:avLst>
+            </a:prstGeom>
+            <a:ln w="76200">
+              <a:solidFill>
+                <a:schemeClr val="tx1"/>
+              </a:solidFill>
+            </a:ln>
+          </p:spPr>
+          <p:style>
+            <a:lnRef idx="1">
+              <a:schemeClr val="accent1"/>
+            </a:lnRef>
+            <a:fillRef idx="0">
+              <a:schemeClr val="accent1"/>
+            </a:fillRef>
+            <a:effectRef idx="0">
+              <a:schemeClr val="accent1"/>
+            </a:effectRef>
+            <a:fontRef idx="minor">
+              <a:schemeClr val="tx1"/>
+            </a:fontRef>
+          </p:style>
+          <p:txBody>
+            <a:bodyPr rtlCol="0" anchor="ctr"/>
+            <a:lstStyle/>
+            <a:p>
+              <a:pPr algn="ctr"/>
+              <a:endParaRPr lang="es-ES"/>
+            </a:p>
+          </p:txBody>
+        </p:sp>
+        <p:sp>
+          <p:nvSpPr>
+            <p:cNvPr id="21" name="20 Arco"/>
+            <p:cNvSpPr/>
+            <p:nvPr/>
+          </p:nvSpPr>
+          <p:spPr>
+            <a:xfrm>
+              <a:off x="2411760" y="1988840"/>
+              <a:ext cx="1440160" cy="1440160"/>
+            </a:xfrm>
+            <a:prstGeom prst="arc">
+              <a:avLst>
+                <a:gd name="adj1" fmla="val 16200000"/>
+                <a:gd name="adj2" fmla="val 5342938"/>
+              </a:avLst>
+            </a:prstGeom>
+            <a:ln w="76200">
+              <a:solidFill>
+                <a:schemeClr val="tx1"/>
+              </a:solidFill>
+            </a:ln>
+          </p:spPr>
+          <p:style>
+            <a:lnRef idx="1">
+              <a:schemeClr val="accent1"/>
+            </a:lnRef>
+            <a:fillRef idx="0">
+              <a:schemeClr val="accent1"/>
+            </a:fillRef>
+            <a:effectRef idx="0">
+              <a:schemeClr val="accent1"/>
+            </a:effectRef>
+            <a:fontRef idx="minor">
+              <a:schemeClr val="tx1"/>
+            </a:fontRef>
+          </p:style>
+          <p:txBody>
+            <a:bodyPr rtlCol="0" anchor="ctr"/>
+            <a:lstStyle/>
+            <a:p>
+              <a:pPr algn="ctr"/>
+              <a:endParaRPr lang="es-ES"/>
+            </a:p>
+          </p:txBody>
+        </p:sp>
+        <p:sp>
+          <p:nvSpPr>
+            <p:cNvPr id="22" name="21 Arco"/>
+            <p:cNvSpPr/>
+            <p:nvPr/>
+          </p:nvSpPr>
+          <p:spPr>
+            <a:xfrm>
+              <a:off x="2123728" y="1700808"/>
+              <a:ext cx="2016224" cy="2016224"/>
+            </a:xfrm>
+            <a:prstGeom prst="arc">
+              <a:avLst>
+                <a:gd name="adj1" fmla="val 16200000"/>
+                <a:gd name="adj2" fmla="val 5342938"/>
+              </a:avLst>
+            </a:prstGeom>
+            <a:ln w="76200">
+              <a:solidFill>
+                <a:schemeClr val="tx1"/>
+              </a:solidFill>
+            </a:ln>
+          </p:spPr>
+          <p:style>
+            <a:lnRef idx="1">
+              <a:schemeClr val="accent1"/>
+            </a:lnRef>
+            <a:fillRef idx="0">
+              <a:schemeClr val="accent1"/>
+            </a:fillRef>
+            <a:effectRef idx="0">
+              <a:schemeClr val="accent1"/>
+            </a:effectRef>
+            <a:fontRef idx="minor">
+              <a:schemeClr val="tx1"/>
+            </a:fontRef>
+          </p:style>
+          <p:txBody>
+            <a:bodyPr rtlCol="0" anchor="ctr"/>
+            <a:lstStyle/>
+            <a:p>
+              <a:pPr algn="ctr"/>
+              <a:endParaRPr lang="es-ES"/>
+            </a:p>
+          </p:txBody>
+        </p:sp>
+      </p:grpSp>
+      <p:sp>
+        <p:nvSpPr>
+          <p:cNvPr id="15" name="14 CuadroTexto"/>
+          <p:cNvSpPr txBox="1"/>
+          <p:nvPr/>
+        </p:nvSpPr>
+        <p:spPr>
+          <a:xfrm>
+            <a:off x="2910429" y="4204837"/>
+            <a:ext cx="736360" cy="708154"/>
+          </a:xfrm>
+          <a:prstGeom prst="rect">
+            <a:avLst/>
+          </a:prstGeom>
+          <a:noFill/>
+        </p:spPr>
+        <p:txBody>
+          <a:bodyPr wrap="square" rtlCol="0">
+            <a:spAutoFit/>
+          </a:bodyPr>
+          <a:lstStyle/>
+          <a:p>
+            <a:pPr algn="ctr"/>
+            <a:r>
+              <a:rPr lang="es-ES" sz="4800" b="1" smtClean="0"/>
+              <a:t>L</a:t>
+            </a:r>
+            <a:endParaRPr lang="es-ES" sz="4800" b="1"/>
+          </a:p>
+        </p:txBody>
+      </p:sp>
+      <p:sp>
+        <p:nvSpPr>
+          <p:cNvPr id="16" name="15 CuadroTexto"/>
+          <p:cNvSpPr txBox="1"/>
+          <p:nvPr/>
+        </p:nvSpPr>
+        <p:spPr>
+          <a:xfrm>
+            <a:off x="8678583" y="4204837"/>
+            <a:ext cx="736360" cy="708154"/>
+          </a:xfrm>
+          <a:prstGeom prst="rect">
+            <a:avLst/>
+          </a:prstGeom>
+          <a:noFill/>
+        </p:spPr>
+        <p:txBody>
+          <a:bodyPr wrap="square" rtlCol="0">
+            <a:spAutoFit/>
+          </a:bodyPr>
+          <a:lstStyle/>
+          <a:p>
+            <a:pPr algn="ctr"/>
+            <a:r>
+              <a:rPr lang="es-ES" sz="4800" b="1" smtClean="0"/>
+              <a:t>R</a:t>
+            </a:r>
+            <a:endParaRPr lang="es-ES" sz="4800" b="1"/>
+          </a:p>
+        </p:txBody>
+      </p:sp>
+      <p:grpSp>
+        <p:nvGrpSpPr>
+          <p:cNvPr id="17" name="25 Grupo"/>
+          <p:cNvGrpSpPr/>
+          <p:nvPr/>
+        </p:nvGrpSpPr>
+        <p:grpSpPr>
+          <a:xfrm>
+            <a:off x="5119509" y="2189729"/>
+            <a:ext cx="2024990" cy="2723262"/>
+            <a:chOff x="3491880" y="1628800"/>
+            <a:chExt cx="2088232" cy="2808312"/>
+          </a:xfrm>
+        </p:grpSpPr>
+        <p:sp>
+          <p:nvSpPr>
+            <p:cNvPr id="18" name="17 Elipse"/>
+            <p:cNvSpPr/>
+            <p:nvPr/>
+          </p:nvSpPr>
+          <p:spPr>
+            <a:xfrm>
+              <a:off x="3851920" y="1628800"/>
+              <a:ext cx="1368152" cy="1368152"/>
+            </a:xfrm>
+            <a:prstGeom prst="ellipse">
+              <a:avLst/>
+            </a:prstGeom>
+            <a:solidFill>
+              <a:schemeClr val="accent1">
+                <a:lumMod val="60000"/>
+                <a:lumOff val="40000"/>
+              </a:schemeClr>
+            </a:solidFill>
+            <a:ln w="76200"/>
+          </p:spPr>
+          <p:style>
+            <a:lnRef idx="2">
+              <a:schemeClr val="accent1">
+                <a:shade val="50000"/>
+              </a:schemeClr>
+            </a:lnRef>
+            <a:fillRef idx="1">
+              <a:schemeClr val="accent1"/>
+            </a:fillRef>
+            <a:effectRef idx="0">
+              <a:schemeClr val="accent1"/>
+            </a:effectRef>
+            <a:fontRef idx="minor">
+              <a:schemeClr val="lt1"/>
+            </a:fontRef>
+          </p:style>
+          <p:txBody>
+            <a:bodyPr rtlCol="0" anchor="ctr"/>
+            <a:lstStyle/>
+            <a:p>
+              <a:pPr algn="ctr"/>
+              <a:endParaRPr lang="es-ES"/>
+            </a:p>
+          </p:txBody>
+        </p:sp>
+        <p:sp>
+          <p:nvSpPr>
+            <p:cNvPr id="19" name="18 Redondear rectángulo de esquina del mismo lado"/>
+            <p:cNvSpPr/>
+            <p:nvPr/>
+          </p:nvSpPr>
+          <p:spPr>
+            <a:xfrm>
+              <a:off x="3491880" y="3068960"/>
+              <a:ext cx="2088232" cy="1368152"/>
+            </a:xfrm>
+            <a:prstGeom prst="round2SameRect">
+              <a:avLst>
+                <a:gd name="adj1" fmla="val 50000"/>
+                <a:gd name="adj2" fmla="val 0"/>
+              </a:avLst>
+            </a:prstGeom>
+            <a:solidFill>
+              <a:schemeClr val="accent1">
+                <a:lumMod val="60000"/>
+                <a:lumOff val="40000"/>
+              </a:schemeClr>
+            </a:solidFill>
+            <a:ln w="76200"/>
+          </p:spPr>
+          <p:style>
+            <a:lnRef idx="2">
+              <a:schemeClr val="accent1">
+                <a:shade val="50000"/>
+              </a:schemeClr>
+            </a:lnRef>
+            <a:fillRef idx="1">
+              <a:schemeClr val="accent1"/>
+            </a:fillRef>
+            <a:effectRef idx="0">
+              <a:schemeClr val="accent1"/>
+            </a:effectRef>
+            <a:fontRef idx="minor">
+              <a:schemeClr val="lt1"/>
+            </a:fontRef>
+          </p:style>
+          <p:txBody>
+            <a:bodyPr rtlCol="0" anchor="ctr"/>
+            <a:lstStyle/>
+            <a:p>
+              <a:pPr algn="ctr"/>
+              <a:endParaRPr lang="es-ES"/>
+            </a:p>
+          </p:txBody>
+        </p:sp>
+      </p:grpSp>
+    </p:spTree>
+  </p:cSld>
+  <p:clrMapOvr>
+    <a:masterClrMapping/>
+  </p:clrMapOvr>
+</p:sld>
+</file>
+
+<file path=ppt/slides/slide7.xml><?xml version="1.0" encoding="utf-8"?>
+<p:sld xmlns:a="http://schemas.openxmlformats.org/drawingml/2006/main" xmlns:r="http://schemas.openxmlformats.org/officeDocument/2006/relationships" xmlns:p="http://schemas.openxmlformats.org/presentationml/2006/main">
+  <p:cSld>
+    <p:spTree>
+      <p:nvGrpSpPr>
+        <p:cNvPr id="1" name=""/>
+        <p:cNvGrpSpPr/>
+        <p:nvPr/>
+      </p:nvGrpSpPr>
+      <p:grpSpPr>
+        <a:xfrm>
+          <a:off x="0" y="0"/>
+          <a:ext cx="0" cy="0"/>
+          <a:chOff x="0" y="0"/>
+          <a:chExt cx="0" cy="0"/>
+        </a:xfrm>
+      </p:grpSpPr>
+      <p:sp>
+        <p:nvSpPr>
           <p:cNvPr id="4" name="3 Rectángulo redondeado"/>
           <p:cNvSpPr/>
           <p:nvPr/>
@@ -9456,7 +10372,7 @@
 </p:sld>
 </file>
 
-<file path=ppt/slides/slide7.xml><?xml version="1.0" encoding="utf-8"?>
+<file path=ppt/slides/slide8.xml><?xml version="1.0" encoding="utf-8"?>
 <p:sld xmlns:a="http://schemas.openxmlformats.org/drawingml/2006/main" xmlns:r="http://schemas.openxmlformats.org/officeDocument/2006/relationships" xmlns:p="http://schemas.openxmlformats.org/presentationml/2006/main">
   <p:cSld>
     <p:spTree>
@@ -10546,7 +11462,7 @@
   <a:extraClrSchemeLst/>
   <a:extLst>
     <a:ext uri="{05A4C25C-085E-4340-85A3-A5531E510DB2}">
-      <thm15:themeFamily xmlns="" xmlns:thm15="http://schemas.microsoft.com/office/thememl/2012/main" name="Office Theme" id="{62F939B6-93AF-4DB8-9C6B-D6C7DFDC589F}" vid="{4A3C46E8-61CC-4603-A589-7422A47A8E4A}"/>
+      <thm15:themeFamily xmlns:thm15="http://schemas.microsoft.com/office/thememl/2012/main" xmlns="" name="Office Theme" id="{62F939B6-93AF-4DB8-9C6B-D6C7DFDC589F}" vid="{4A3C46E8-61CC-4603-A589-7422A47A8E4A}"/>
     </a:ext>
   </a:extLst>
 </a:theme>

</xml_diff>